<commit_message>
chkpt for cms v3
</commit_message>
<xml_diff>
--- a/slides/cms-demo-v1.pptx
+++ b/slides/cms-demo-v1.pptx
@@ -5,7 +5,7 @@
     <p:sldMasterId id="2147483648" r:id="rId1"/>
   </p:sldMasterIdLst>
   <p:notesMasterIdLst>
-    <p:notesMasterId r:id="rId15"/>
+    <p:notesMasterId r:id="rId16"/>
   </p:notesMasterIdLst>
   <p:sldIdLst>
     <p:sldId id="274" r:id="rId2"/>
@@ -16,11 +16,12 @@
     <p:sldId id="269" r:id="rId7"/>
     <p:sldId id="272" r:id="rId8"/>
     <p:sldId id="258" r:id="rId9"/>
-    <p:sldId id="259" r:id="rId10"/>
-    <p:sldId id="273" r:id="rId11"/>
-    <p:sldId id="267" r:id="rId12"/>
-    <p:sldId id="268" r:id="rId13"/>
-    <p:sldId id="261" r:id="rId14"/>
+    <p:sldId id="276" r:id="rId10"/>
+    <p:sldId id="259" r:id="rId11"/>
+    <p:sldId id="273" r:id="rId12"/>
+    <p:sldId id="267" r:id="rId13"/>
+    <p:sldId id="268" r:id="rId14"/>
+    <p:sldId id="261" r:id="rId15"/>
   </p:sldIdLst>
   <p:sldSz cx="12192000" cy="6858000"/>
   <p:notesSz cx="6858000" cy="9144000"/>
@@ -3322,9 +3323,16 @@
             <p:ph type="ctrTitle"/>
           </p:nvPr>
         </p:nvSpPr>
-        <p:spPr/>
+        <p:spPr>
+          <a:xfrm>
+            <a:off x="1524000" y="1122363"/>
+            <a:ext cx="9412224" cy="2387600"/>
+          </a:xfrm>
+        </p:spPr>
         <p:txBody>
-          <a:bodyPr/>
+          <a:bodyPr>
+            <a:normAutofit fontScale="90000"/>
+          </a:bodyPr>
           <a:lstStyle/>
           <a:p>
             <a:r>
@@ -3353,7 +3361,35 @@
             </a:r>
             <a:r>
               <a:rPr lang="en-GB" dirty="0"/>
-              <a:t>Data Transfer Orchestrator</a:t>
+              <a:t>Data </a:t>
+            </a:r>
+            <a:r>
+              <a:rPr lang="en-US" altLang="zh-CN" dirty="0" smtClean="0"/>
+              <a:t>Distribution</a:t>
+            </a:r>
+            <a:r>
+              <a:rPr lang="zh-CN" altLang="en-US" dirty="0" smtClean="0"/>
+              <a:t> </a:t>
+            </a:r>
+            <a:r>
+              <a:rPr lang="en-US" altLang="zh-CN" dirty="0" smtClean="0"/>
+              <a:t>for</a:t>
+            </a:r>
+            <a:r>
+              <a:rPr lang="zh-CN" altLang="en-US" dirty="0" smtClean="0"/>
+              <a:t> </a:t>
+            </a:r>
+            <a:r>
+              <a:rPr lang="en-US" altLang="zh-CN" dirty="0" err="1" smtClean="0"/>
+              <a:t>Exascale</a:t>
+            </a:r>
+            <a:r>
+              <a:rPr lang="zh-CN" altLang="en-US" dirty="0" smtClean="0"/>
+              <a:t> </a:t>
+            </a:r>
+            <a:r>
+              <a:rPr lang="en-US" altLang="zh-CN" dirty="0" smtClean="0"/>
+              <a:t>Sciences</a:t>
             </a:r>
             <a:endParaRPr lang="en-US" dirty="0"/>
           </a:p>
@@ -3399,6 +3435,222 @@
 </file>
 
 <file path=ppt/slides/slide10.xml><?xml version="1.0" encoding="utf-8"?>
+<p:sld xmlns:a="http://schemas.openxmlformats.org/drawingml/2006/main" xmlns:r="http://schemas.openxmlformats.org/officeDocument/2006/relationships" xmlns:p="http://schemas.openxmlformats.org/presentationml/2006/main">
+  <p:cSld>
+    <p:spTree>
+      <p:nvGrpSpPr>
+        <p:cNvPr id="1" name=""/>
+        <p:cNvGrpSpPr/>
+        <p:nvPr/>
+      </p:nvGrpSpPr>
+      <p:grpSpPr>
+        <a:xfrm>
+          <a:off x="0" y="0"/>
+          <a:ext cx="0" cy="0"/>
+          <a:chOff x="0" y="0"/>
+          <a:chExt cx="0" cy="0"/>
+        </a:xfrm>
+      </p:grpSpPr>
+      <p:sp>
+        <p:nvSpPr>
+          <p:cNvPr id="2" name="Rectangle 1"/>
+          <p:cNvSpPr/>
+          <p:nvPr/>
+        </p:nvSpPr>
+        <p:spPr>
+          <a:xfrm>
+            <a:off x="190500" y="1219766"/>
+            <a:ext cx="11780520" cy="4524315"/>
+          </a:xfrm>
+          <a:prstGeom prst="rect">
+            <a:avLst/>
+          </a:prstGeom>
+        </p:spPr>
+        <p:txBody>
+          <a:bodyPr wrap="square">
+            <a:spAutoFit/>
+          </a:bodyPr>
+          <a:lstStyle/>
+          <a:p>
+            <a:pPr marL="342900" indent="-342900">
+              <a:buFont typeface="Arial" panose="020B0604020202020204" pitchFamily="34" charset="0"/>
+              <a:buChar char="•"/>
+            </a:pPr>
+            <a:r>
+              <a:rPr lang="en-GB" sz="3200" b="1" dirty="0" smtClean="0"/>
+              <a:t>RESTful-API</a:t>
+            </a:r>
+            <a:r>
+              <a:rPr lang="en-GB" sz="3200" b="1" dirty="0"/>
+              <a:t>: </a:t>
+            </a:r>
+            <a:r>
+              <a:rPr lang="en-GB" sz="3200" dirty="0"/>
+              <a:t>allow users submit and manage transfer request through different interface</a:t>
+            </a:r>
+          </a:p>
+          <a:p>
+            <a:pPr marL="342900" indent="-342900">
+              <a:buFont typeface="Arial" panose="020B0604020202020204" pitchFamily="34" charset="0"/>
+              <a:buChar char="•"/>
+            </a:pPr>
+            <a:r>
+              <a:rPr lang="en-GB" sz="3200" b="1" dirty="0"/>
+              <a:t>ALTO: </a:t>
+            </a:r>
+            <a:r>
+              <a:rPr lang="en-GB" sz="3200" dirty="0"/>
+              <a:t>collect </a:t>
+            </a:r>
+            <a:r>
+              <a:rPr lang="en-GB" sz="3200" dirty="0" smtClean="0"/>
+              <a:t>on-demand, real-time, minimal abstract routing </a:t>
+            </a:r>
+            <a:r>
+              <a:rPr lang="en-GB" sz="3200" dirty="0"/>
+              <a:t>information from different domains</a:t>
+            </a:r>
+          </a:p>
+          <a:p>
+            <a:pPr marL="342900" indent="-342900">
+              <a:buFont typeface="Arial" panose="020B0604020202020204" pitchFamily="34" charset="0"/>
+              <a:buChar char="•"/>
+            </a:pPr>
+            <a:r>
+              <a:rPr lang="en-GB" sz="3200" b="1" dirty="0" err="1"/>
+              <a:t>ExaO</a:t>
+            </a:r>
+            <a:r>
+              <a:rPr lang="en-GB" sz="3200" b="1" dirty="0"/>
+              <a:t> Scheduler: </a:t>
+            </a:r>
+            <a:r>
+              <a:rPr lang="en-GB" sz="3200" dirty="0"/>
+              <a:t>centralized, efficient file-level </a:t>
+            </a:r>
+            <a:r>
+              <a:rPr lang="en-GB" sz="3200" dirty="0" smtClean="0"/>
+              <a:t>scheduling and network resource allocation </a:t>
+            </a:r>
+            <a:endParaRPr lang="en-GB" sz="3200" dirty="0"/>
+          </a:p>
+          <a:p>
+            <a:pPr marL="342900" indent="-342900">
+              <a:buFont typeface="Arial" panose="020B0604020202020204" pitchFamily="34" charset="0"/>
+              <a:buChar char="•"/>
+            </a:pPr>
+            <a:r>
+              <a:rPr lang="en-GB" sz="3200" b="1" dirty="0"/>
+              <a:t>FDT: </a:t>
+            </a:r>
+            <a:r>
+              <a:rPr lang="en-GB" sz="3200" dirty="0"/>
+              <a:t>efficient data transfer tools on end hosts</a:t>
+            </a:r>
+          </a:p>
+          <a:p>
+            <a:pPr marL="342900" indent="-342900">
+              <a:buFont typeface="Arial" panose="020B0604020202020204" pitchFamily="34" charset="0"/>
+              <a:buChar char="•"/>
+            </a:pPr>
+            <a:r>
+              <a:rPr lang="en-GB" sz="3200" b="1" dirty="0" err="1"/>
+              <a:t>Monalisa</a:t>
+            </a:r>
+            <a:r>
+              <a:rPr lang="en-GB" sz="3200" b="1" dirty="0"/>
+              <a:t>: </a:t>
+            </a:r>
+            <a:r>
+              <a:rPr lang="en-GB" sz="3200" dirty="0"/>
+              <a:t>Distributed monitoring infrastructure for real time monitoring </a:t>
+            </a:r>
+            <a:r>
+              <a:rPr lang="en-GB" sz="3200" dirty="0" smtClean="0"/>
+              <a:t>of each </a:t>
+            </a:r>
+            <a:r>
+              <a:rPr lang="en-GB" sz="3200" dirty="0"/>
+              <a:t>flow, </a:t>
+            </a:r>
+            <a:r>
+              <a:rPr lang="en-GB" sz="3200" dirty="0" smtClean="0"/>
+              <a:t>transfer</a:t>
+            </a:r>
+            <a:r>
+              <a:rPr lang="en-GB" sz="3200" b="1" dirty="0" smtClean="0"/>
+              <a:t> </a:t>
+            </a:r>
+            <a:endParaRPr lang="en-GB" sz="3200" b="1" dirty="0"/>
+          </a:p>
+        </p:txBody>
+      </p:sp>
+      <p:sp>
+        <p:nvSpPr>
+          <p:cNvPr id="55" name="Rectangle 54"/>
+          <p:cNvSpPr/>
+          <p:nvPr/>
+        </p:nvSpPr>
+        <p:spPr>
+          <a:xfrm>
+            <a:off x="321997" y="144050"/>
+            <a:ext cx="4934621" cy="769441"/>
+          </a:xfrm>
+          <a:prstGeom prst="rect">
+            <a:avLst/>
+          </a:prstGeom>
+        </p:spPr>
+        <p:txBody>
+          <a:bodyPr wrap="none">
+            <a:spAutoFit/>
+          </a:bodyPr>
+          <a:lstStyle/>
+          <a:p>
+            <a:r>
+              <a:rPr lang="en-GB" sz="4400" dirty="0" smtClean="0">
+                <a:latin typeface="+mj-lt"/>
+                <a:ea typeface="+mj-ea"/>
+                <a:cs typeface="+mj-cs"/>
+              </a:rPr>
+              <a:t>Components of </a:t>
+            </a:r>
+            <a:r>
+              <a:rPr lang="en-GB" sz="4400" dirty="0" err="1" smtClean="0">
+                <a:latin typeface="+mj-lt"/>
+                <a:ea typeface="+mj-ea"/>
+                <a:cs typeface="+mj-cs"/>
+              </a:rPr>
+              <a:t>ExaO</a:t>
+            </a:r>
+            <a:endParaRPr lang="en-GB" sz="4400" dirty="0">
+              <a:latin typeface="+mj-lt"/>
+              <a:ea typeface="+mj-ea"/>
+              <a:cs typeface="+mj-cs"/>
+            </a:endParaRPr>
+          </a:p>
+        </p:txBody>
+      </p:sp>
+    </p:spTree>
+    <p:extLst>
+      <p:ext uri="{BB962C8B-B14F-4D97-AF65-F5344CB8AC3E}">
+        <p14:creationId xmlns:p14="http://schemas.microsoft.com/office/powerpoint/2010/main" val="934554512"/>
+      </p:ext>
+    </p:extLst>
+  </p:cSld>
+  <p:clrMapOvr>
+    <a:masterClrMapping/>
+  </p:clrMapOvr>
+  <p:timing>
+    <p:tnLst>
+      <p:par>
+        <p:cTn id="1" dur="indefinite" restart="never" nodeType="tmRoot"/>
+      </p:par>
+    </p:tnLst>
+  </p:timing>
+</p:sld>
+</file>
+
+<file path=ppt/slides/slide11.xml><?xml version="1.0" encoding="utf-8"?>
 <p:sld xmlns:a="http://schemas.openxmlformats.org/drawingml/2006/main" xmlns:r="http://schemas.openxmlformats.org/officeDocument/2006/relationships" xmlns:p="http://schemas.openxmlformats.org/presentationml/2006/main">
   <p:cSld>
     <p:spTree>
@@ -3720,7 +3972,7 @@
 </p:sld>
 </file>
 
-<file path=ppt/slides/slide11.xml><?xml version="1.0" encoding="utf-8"?>
+<file path=ppt/slides/slide12.xml><?xml version="1.0" encoding="utf-8"?>
 <p:sld xmlns:a="http://schemas.openxmlformats.org/drawingml/2006/main" xmlns:r="http://schemas.openxmlformats.org/officeDocument/2006/relationships" xmlns:p="http://schemas.openxmlformats.org/presentationml/2006/main">
   <p:cSld>
     <p:spTree>
@@ -5441,7 +5693,7 @@
 </p:sld>
 </file>
 
-<file path=ppt/slides/slide12.xml><?xml version="1.0" encoding="utf-8"?>
+<file path=ppt/slides/slide13.xml><?xml version="1.0" encoding="utf-8"?>
 <p:sld xmlns:a="http://schemas.openxmlformats.org/drawingml/2006/main" xmlns:r="http://schemas.openxmlformats.org/officeDocument/2006/relationships" xmlns:p="http://schemas.openxmlformats.org/presentationml/2006/main">
   <p:cSld>
     <p:spTree>
@@ -6972,11 +7224,11 @@
           <a:p>
             <a:pPr algn="ctr"/>
             <a:r>
-              <a:rPr lang="en-US" sz="1600" b="1" smtClean="0"/>
+              <a:rPr lang="en-US" sz="1600" b="1" dirty="0" smtClean="0"/>
               <a:t>16.7G</a:t>
             </a:r>
             <a:r>
-              <a:rPr lang="en-US" altLang="zh-CN" sz="1600" b="1" smtClean="0"/>
+              <a:rPr lang="en-US" altLang="zh-CN" sz="1600" b="1" dirty="0" smtClean="0"/>
               <a:t>bps</a:t>
             </a:r>
             <a:endParaRPr lang="en-US" sz="1600" b="1" dirty="0"/>
@@ -9121,7 +9373,7 @@
 </p:sld>
 </file>
 
-<file path=ppt/slides/slide13.xml><?xml version="1.0" encoding="utf-8"?>
+<file path=ppt/slides/slide14.xml><?xml version="1.0" encoding="utf-8"?>
 <p:sld xmlns:a="http://schemas.openxmlformats.org/drawingml/2006/main" xmlns:r="http://schemas.openxmlformats.org/officeDocument/2006/relationships" xmlns:p="http://schemas.openxmlformats.org/presentationml/2006/main">
   <p:cSld>
     <p:spTree>
@@ -9704,6 +9956,22 @@
               <a:rPr lang="en-US" altLang="zh-CN" dirty="0" smtClean="0"/>
               <a:t>Background</a:t>
             </a:r>
+            <a:r>
+              <a:rPr lang="zh-CN" altLang="en-US" dirty="0" smtClean="0"/>
+              <a:t> </a:t>
+            </a:r>
+            <a:r>
+              <a:rPr lang="en-US" altLang="zh-CN" dirty="0" smtClean="0"/>
+              <a:t>(TODO: change figure, add </a:t>
+            </a:r>
+            <a:r>
+              <a:rPr lang="en-US" altLang="zh-CN" dirty="0" err="1" smtClean="0"/>
+              <a:t>datasize</a:t>
+            </a:r>
+            <a:r>
+              <a:rPr lang="en-US" altLang="zh-CN" dirty="0" smtClean="0"/>
+              <a:t>)</a:t>
+            </a:r>
             <a:endParaRPr lang="en-US" dirty="0"/>
           </a:p>
         </p:txBody>
@@ -10052,7 +10320,7 @@
         </p:blipFill>
         <p:spPr bwMode="auto">
           <a:xfrm>
-            <a:off x="6106332" y="1825625"/>
+            <a:off x="6045372" y="1825625"/>
             <a:ext cx="6089629" cy="4125724"/>
           </a:xfrm>
           <a:prstGeom prst="rect">
@@ -17536,7 +17804,7 @@
         </p:nvSpPr>
         <p:spPr>
           <a:xfrm>
-            <a:off x="3654661" y="979379"/>
+            <a:off x="3654661" y="1003763"/>
             <a:ext cx="1581401" cy="874123"/>
           </a:xfrm>
           <a:prstGeom prst="roundRect">
@@ -18038,7 +18306,7 @@
         </p:nvCxnSpPr>
         <p:spPr>
           <a:xfrm flipH="1" flipV="1">
-            <a:off x="5316070" y="1421786"/>
+            <a:off x="5316070" y="1446170"/>
             <a:ext cx="1211576" cy="7814"/>
           </a:xfrm>
           <a:prstGeom prst="straightConnector1">
@@ -18049,7 +18317,7 @@
               <a:schemeClr val="tx1"/>
             </a:solidFill>
             <a:headEnd type="triangle"/>
-            <a:tailEnd type="none"/>
+            <a:tailEnd type="triangle"/>
           </a:ln>
         </p:spPr>
         <p:style>
@@ -18660,10 +18928,9 @@
           <a:p>
             <a:pPr algn="ctr"/>
             <a:r>
-              <a:rPr lang="en-GB" sz="1200" dirty="0" err="1"/>
+              <a:rPr lang="en-GB" sz="1200" dirty="0"/>
               <a:t>FDTDaemon</a:t>
             </a:r>
-            <a:endParaRPr lang="en-GB" sz="1200" dirty="0"/>
           </a:p>
         </p:txBody>
       </p:sp>
@@ -18757,10 +19024,9 @@
           <a:p>
             <a:pPr algn="ctr"/>
             <a:r>
-              <a:rPr lang="en-GB" sz="1200" dirty="0" err="1"/>
+              <a:rPr lang="en-GB" sz="1200" dirty="0"/>
               <a:t>FDTDaemon</a:t>
             </a:r>
-            <a:endParaRPr lang="en-GB" sz="1200" dirty="0"/>
           </a:p>
         </p:txBody>
       </p:sp>
@@ -18812,10 +19078,9 @@
           <a:p>
             <a:pPr algn="ctr"/>
             <a:r>
-              <a:rPr lang="en-GB" sz="1200" dirty="0" err="1"/>
+              <a:rPr lang="en-GB" sz="1200" dirty="0"/>
               <a:t>FDTDaemon</a:t>
             </a:r>
-            <a:endParaRPr lang="en-GB" sz="1200" dirty="0"/>
           </a:p>
         </p:txBody>
       </p:sp>
@@ -19178,10 +19443,9 @@
           <a:p>
             <a:pPr algn="ctr"/>
             <a:r>
-              <a:rPr lang="en-GB" sz="1200" dirty="0" err="1"/>
+              <a:rPr lang="en-GB" sz="1200" dirty="0"/>
               <a:t>MLSensor</a:t>
             </a:r>
-            <a:endParaRPr lang="en-GB" sz="1200" dirty="0"/>
           </a:p>
         </p:txBody>
       </p:sp>
@@ -19233,10 +19497,9 @@
           <a:p>
             <a:pPr algn="ctr"/>
             <a:r>
-              <a:rPr lang="en-GB" sz="1200" dirty="0" err="1"/>
+              <a:rPr lang="en-GB" sz="1200" dirty="0"/>
               <a:t>MLSensor</a:t>
             </a:r>
-            <a:endParaRPr lang="en-GB" sz="1200" dirty="0"/>
           </a:p>
         </p:txBody>
       </p:sp>
@@ -19288,10 +19551,9 @@
           <a:p>
             <a:pPr algn="ctr"/>
             <a:r>
-              <a:rPr lang="en-GB" sz="1200" dirty="0" err="1"/>
+              <a:rPr lang="en-GB" sz="1200" dirty="0"/>
               <a:t>MLSensor</a:t>
             </a:r>
-            <a:endParaRPr lang="en-GB" sz="1200" dirty="0"/>
           </a:p>
         </p:txBody>
       </p:sp>
@@ -19342,7 +19604,7 @@
         </p:nvCxnSpPr>
         <p:spPr>
           <a:xfrm flipH="1">
-            <a:off x="4894018" y="4363607"/>
+            <a:off x="4894018" y="4381243"/>
             <a:ext cx="2472518" cy="1051661"/>
           </a:xfrm>
           <a:prstGeom prst="straightConnector1">
@@ -19721,7 +19983,7 @@
             <a:solidFill>
               <a:srgbClr val="FF0000"/>
             </a:solidFill>
-            <a:headEnd type="none"/>
+            <a:headEnd type="triangle"/>
             <a:tailEnd type="triangle"/>
           </a:ln>
         </p:spPr>
@@ -20091,8 +20353,8 @@
         </p:nvSpPr>
         <p:spPr>
           <a:xfrm>
-            <a:off x="5331209" y="718790"/>
-            <a:ext cx="1181298" cy="584775"/>
+            <a:off x="5372995" y="743528"/>
+            <a:ext cx="1139511" cy="584775"/>
           </a:xfrm>
           <a:prstGeom prst="rect">
             <a:avLst/>
@@ -20385,43 +20647,6 @@
           </a:p>
         </p:txBody>
       </p:sp>
-      <p:cxnSp>
-        <p:nvCxnSpPr>
-          <p:cNvPr id="71" name="Straight Arrow Connector 70"/>
-          <p:cNvCxnSpPr/>
-          <p:nvPr/>
-        </p:nvCxnSpPr>
-        <p:spPr>
-          <a:xfrm flipH="1" flipV="1">
-            <a:off x="5296972" y="1590036"/>
-            <a:ext cx="1211576" cy="7814"/>
-          </a:xfrm>
-          <a:prstGeom prst="straightConnector1">
-            <a:avLst/>
-          </a:prstGeom>
-          <a:ln w="38100">
-            <a:solidFill>
-              <a:schemeClr val="tx1"/>
-            </a:solidFill>
-            <a:headEnd type="none"/>
-            <a:tailEnd type="triangle"/>
-          </a:ln>
-        </p:spPr>
-        <p:style>
-          <a:lnRef idx="1">
-            <a:schemeClr val="accent1"/>
-          </a:lnRef>
-          <a:fillRef idx="0">
-            <a:schemeClr val="accent1"/>
-          </a:fillRef>
-          <a:effectRef idx="0">
-            <a:schemeClr val="accent1"/>
-          </a:effectRef>
-          <a:fontRef idx="minor">
-            <a:schemeClr val="tx1"/>
-          </a:fontRef>
-        </p:style>
-      </p:cxnSp>
       <p:sp>
         <p:nvSpPr>
           <p:cNvPr id="72" name="TextBox 71"/>
@@ -20430,7 +20655,7 @@
         </p:nvSpPr>
         <p:spPr>
           <a:xfrm>
-            <a:off x="5934035" y="1533688"/>
+            <a:off x="5372996" y="1523287"/>
             <a:ext cx="1129738" cy="584775"/>
           </a:xfrm>
           <a:prstGeom prst="rect">
@@ -20527,7 +20752,7 @@
         </p:nvSpPr>
         <p:spPr>
           <a:xfrm>
-            <a:off x="6381557" y="4163627"/>
+            <a:off x="6138493" y="3553875"/>
             <a:ext cx="1129738" cy="584775"/>
           </a:xfrm>
           <a:prstGeom prst="rect">
@@ -20650,6 +20875,70 @@
               <a:t>Update database</a:t>
             </a:r>
             <a:endParaRPr lang="en-US" dirty="0"/>
+          </a:p>
+        </p:txBody>
+      </p:sp>
+      <p:sp>
+        <p:nvSpPr>
+          <p:cNvPr id="79" name="TextBox 78"/>
+          <p:cNvSpPr txBox="1"/>
+          <p:nvPr/>
+        </p:nvSpPr>
+        <p:spPr>
+          <a:xfrm>
+            <a:off x="8573349" y="1964030"/>
+            <a:ext cx="1129738" cy="584775"/>
+          </a:xfrm>
+          <a:prstGeom prst="rect">
+            <a:avLst/>
+          </a:prstGeom>
+          <a:solidFill>
+            <a:schemeClr val="bg1">
+              <a:lumMod val="50000"/>
+            </a:schemeClr>
+          </a:solidFill>
+        </p:spPr>
+        <p:txBody>
+          <a:bodyPr wrap="square" rtlCol="0">
+            <a:spAutoFit/>
+          </a:bodyPr>
+          <a:lstStyle>
+            <a:defPPr>
+              <a:defRPr lang="en-US"/>
+            </a:defPPr>
+            <a:lvl1pPr algn="ctr">
+              <a:defRPr sz="1600">
+                <a:solidFill>
+                  <a:schemeClr val="bg1"/>
+                </a:solidFill>
+              </a:defRPr>
+            </a:lvl1pPr>
+          </a:lstStyle>
+          <a:p>
+            <a:r>
+              <a:rPr lang="en-US" altLang="zh-CN" dirty="0" smtClean="0"/>
+              <a:t>Install</a:t>
+            </a:r>
+            <a:r>
+              <a:rPr lang="zh-CN" altLang="en-US" dirty="0" smtClean="0"/>
+              <a:t> </a:t>
+            </a:r>
+            <a:endParaRPr lang="en-US" altLang="zh-CN" dirty="0" smtClean="0"/>
+          </a:p>
+          <a:p>
+            <a:r>
+              <a:rPr lang="en-US" altLang="zh-CN" dirty="0" smtClean="0"/>
+              <a:t>flow</a:t>
+            </a:r>
+            <a:r>
+              <a:rPr lang="zh-CN" altLang="en-US" dirty="0" smtClean="0"/>
+              <a:t> </a:t>
+            </a:r>
+            <a:r>
+              <a:rPr lang="en-US" altLang="zh-CN" dirty="0" smtClean="0"/>
+              <a:t>rules</a:t>
+            </a:r>
+            <a:endParaRPr lang="en-US" altLang="zh-CN" dirty="0" smtClean="0"/>
           </a:p>
         </p:txBody>
       </p:sp>
@@ -21070,39 +21359,21 @@
                                   </p:childTnLst>
                                 </p:cTn>
                               </p:par>
-                            </p:childTnLst>
-                          </p:cTn>
-                        </p:par>
-                      </p:childTnLst>
-                    </p:cTn>
-                  </p:par>
-                  <p:par>
-                    <p:cTn id="37" fill="hold">
-                      <p:stCondLst>
-                        <p:cond delay="indefinite"/>
-                      </p:stCondLst>
-                      <p:childTnLst>
-                        <p:par>
-                          <p:cTn id="38" fill="hold">
-                            <p:stCondLst>
-                              <p:cond delay="0"/>
-                            </p:stCondLst>
-                            <p:childTnLst>
                               <p:par>
-                                <p:cTn id="39" presetID="1" presetClass="entr" presetSubtype="0" fill="hold" nodeType="clickEffect">
+                                <p:cTn id="37" presetID="1" presetClass="entr" presetSubtype="0" fill="hold" grpId="0" nodeType="withEffect">
                                   <p:stCondLst>
                                     <p:cond delay="0"/>
                                   </p:stCondLst>
                                   <p:childTnLst>
                                     <p:set>
                                       <p:cBhvr>
-                                        <p:cTn id="40" dur="1" fill="hold">
+                                        <p:cTn id="38" dur="1" fill="hold">
                                           <p:stCondLst>
                                             <p:cond delay="0"/>
                                           </p:stCondLst>
                                         </p:cTn>
                                         <p:tgtEl>
-                                          <p:spTgt spid="71"/>
+                                          <p:spTgt spid="72"/>
                                         </p:tgtEl>
                                         <p:attrNameLst>
                                           <p:attrName>style.visibility</p:attrName>
@@ -21115,8 +21386,26 @@
                                   </p:childTnLst>
                                 </p:cTn>
                               </p:par>
+                            </p:childTnLst>
+                          </p:cTn>
+                        </p:par>
+                      </p:childTnLst>
+                    </p:cTn>
+                  </p:par>
+                  <p:par>
+                    <p:cTn id="39" fill="hold">
+                      <p:stCondLst>
+                        <p:cond delay="indefinite"/>
+                      </p:stCondLst>
+                      <p:childTnLst>
+                        <p:par>
+                          <p:cTn id="40" fill="hold">
+                            <p:stCondLst>
+                              <p:cond delay="0"/>
+                            </p:stCondLst>
+                            <p:childTnLst>
                               <p:par>
-                                <p:cTn id="41" presetID="1" presetClass="entr" presetSubtype="0" fill="hold" grpId="0" nodeType="withEffect">
+                                <p:cTn id="41" presetID="1" presetClass="entr" presetSubtype="0" fill="hold" grpId="0" nodeType="clickEffect">
                                   <p:stCondLst>
                                     <p:cond delay="0"/>
                                   </p:stCondLst>
@@ -21129,7 +21418,7 @@
                                           </p:stCondLst>
                                         </p:cTn>
                                         <p:tgtEl>
-                                          <p:spTgt spid="72"/>
+                                          <p:spTgt spid="73"/>
                                         </p:tgtEl>
                                         <p:attrNameLst>
                                           <p:attrName>style.visibility</p:attrName>
@@ -21174,7 +21463,7 @@
                                           </p:stCondLst>
                                         </p:cTn>
                                         <p:tgtEl>
-                                          <p:spTgt spid="73"/>
+                                          <p:spTgt spid="74"/>
                                         </p:tgtEl>
                                         <p:attrNameLst>
                                           <p:attrName>style.visibility</p:attrName>
@@ -21219,7 +21508,7 @@
                                           </p:stCondLst>
                                         </p:cTn>
                                         <p:tgtEl>
-                                          <p:spTgt spid="74"/>
+                                          <p:spTgt spid="77"/>
                                         </p:tgtEl>
                                         <p:attrNameLst>
                                           <p:attrName>style.visibility</p:attrName>
@@ -21264,7 +21553,7 @@
                                           </p:stCondLst>
                                         </p:cTn>
                                         <p:tgtEl>
-                                          <p:spTgt spid="77"/>
+                                          <p:spTgt spid="78"/>
                                         </p:tgtEl>
                                         <p:attrNameLst>
                                           <p:attrName>style.visibility</p:attrName>
@@ -21309,7 +21598,7 @@
                                           </p:stCondLst>
                                         </p:cTn>
                                         <p:tgtEl>
-                                          <p:spTgt spid="78"/>
+                                          <p:spTgt spid="79"/>
                                         </p:tgtEl>
                                         <p:attrNameLst>
                                           <p:attrName>style.visibility</p:attrName>
@@ -21361,6 +21650,7 @@
       <p:bldP spid="74" grpId="0" animBg="1"/>
       <p:bldP spid="77" grpId="0" animBg="1"/>
       <p:bldP spid="78" grpId="0" animBg="1"/>
+      <p:bldP spid="79" grpId="0" animBg="1"/>
     </p:bldLst>
   </p:timing>
 </p:sld>
@@ -21385,187 +21675,3651 @@
       </p:grpSpPr>
       <p:sp>
         <p:nvSpPr>
-          <p:cNvPr id="2" name="Rectangle 1"/>
+          <p:cNvPr id="4" name="Rounded Rectangle 3"/>
           <p:cNvSpPr/>
           <p:nvPr/>
         </p:nvSpPr>
         <p:spPr>
           <a:xfrm>
-            <a:off x="190500" y="1219766"/>
-            <a:ext cx="11780520" cy="4524315"/>
-          </a:xfrm>
-          <a:prstGeom prst="rect">
-            <a:avLst/>
-          </a:prstGeom>
-        </p:spPr>
+            <a:off x="5875829" y="272681"/>
+            <a:ext cx="1057658" cy="370154"/>
+          </a:xfrm>
+          <a:prstGeom prst="roundRect">
+            <a:avLst/>
+          </a:prstGeom>
+          <a:solidFill>
+            <a:srgbClr val="00B0F0"/>
+          </a:solidFill>
+          <a:effectLst>
+            <a:innerShdw blurRad="63500" dist="50800" dir="18900000">
+              <a:prstClr val="black">
+                <a:alpha val="50000"/>
+              </a:prstClr>
+            </a:innerShdw>
+          </a:effectLst>
+        </p:spPr>
+        <p:style>
+          <a:lnRef idx="2">
+            <a:schemeClr val="dk1"/>
+          </a:lnRef>
+          <a:fillRef idx="1">
+            <a:schemeClr val="lt1"/>
+          </a:fillRef>
+          <a:effectRef idx="0">
+            <a:schemeClr val="dk1"/>
+          </a:effectRef>
+          <a:fontRef idx="minor">
+            <a:schemeClr val="dk1"/>
+          </a:fontRef>
+        </p:style>
         <p:txBody>
-          <a:bodyPr wrap="square">
-            <a:spAutoFit/>
-          </a:bodyPr>
+          <a:bodyPr rtlCol="0" anchor="ctr"/>
           <a:lstStyle/>
           <a:p>
-            <a:pPr marL="342900" indent="-342900">
-              <a:buFont typeface="Arial" panose="020B0604020202020204" pitchFamily="34" charset="0"/>
-              <a:buChar char="•"/>
-            </a:pPr>
-            <a:r>
-              <a:rPr lang="en-GB" sz="3200" b="1" dirty="0" smtClean="0"/>
-              <a:t>RESTful-API</a:t>
-            </a:r>
-            <a:r>
-              <a:rPr lang="en-GB" sz="3200" b="1" dirty="0"/>
-              <a:t>: </a:t>
-            </a:r>
-            <a:r>
-              <a:rPr lang="en-GB" sz="3200" dirty="0"/>
-              <a:t>allow users submit and manage transfer request through different interface</a:t>
-            </a:r>
-          </a:p>
-          <a:p>
-            <a:pPr marL="342900" indent="-342900">
-              <a:buFont typeface="Arial" panose="020B0604020202020204" pitchFamily="34" charset="0"/>
-              <a:buChar char="•"/>
-            </a:pPr>
-            <a:r>
-              <a:rPr lang="en-GB" sz="3200" b="1" dirty="0"/>
-              <a:t>ALTO: </a:t>
-            </a:r>
-            <a:r>
-              <a:rPr lang="en-GB" sz="3200" dirty="0"/>
-              <a:t>collect </a:t>
-            </a:r>
-            <a:r>
-              <a:rPr lang="en-GB" sz="3200" dirty="0" smtClean="0"/>
-              <a:t>on-demand, real-time, minimal abstract routing </a:t>
-            </a:r>
-            <a:r>
-              <a:rPr lang="en-GB" sz="3200" dirty="0"/>
-              <a:t>information from different domains</a:t>
-            </a:r>
-          </a:p>
-          <a:p>
-            <a:pPr marL="342900" indent="-342900">
-              <a:buFont typeface="Arial" panose="020B0604020202020204" pitchFamily="34" charset="0"/>
-              <a:buChar char="•"/>
-            </a:pPr>
-            <a:r>
-              <a:rPr lang="en-GB" sz="3200" b="1" dirty="0" err="1"/>
-              <a:t>ExaO</a:t>
-            </a:r>
-            <a:r>
-              <a:rPr lang="en-GB" sz="3200" b="1" dirty="0"/>
-              <a:t> Scheduler: </a:t>
-            </a:r>
-            <a:r>
-              <a:rPr lang="en-GB" sz="3200" dirty="0"/>
-              <a:t>centralized, efficient file-level </a:t>
-            </a:r>
-            <a:r>
-              <a:rPr lang="en-GB" sz="3200" dirty="0" smtClean="0"/>
-              <a:t>scheduling and network resource allocation </a:t>
-            </a:r>
-            <a:endParaRPr lang="en-GB" sz="3200" dirty="0"/>
-          </a:p>
-          <a:p>
-            <a:pPr marL="342900" indent="-342900">
-              <a:buFont typeface="Arial" panose="020B0604020202020204" pitchFamily="34" charset="0"/>
-              <a:buChar char="•"/>
-            </a:pPr>
-            <a:r>
-              <a:rPr lang="en-GB" sz="3200" b="1" dirty="0"/>
-              <a:t>FDT: </a:t>
-            </a:r>
-            <a:r>
-              <a:rPr lang="en-GB" sz="3200" dirty="0"/>
-              <a:t>efficient data transfer tools on end hosts</a:t>
-            </a:r>
-          </a:p>
-          <a:p>
-            <a:pPr marL="342900" indent="-342900">
-              <a:buFont typeface="Arial" panose="020B0604020202020204" pitchFamily="34" charset="0"/>
-              <a:buChar char="•"/>
-            </a:pPr>
-            <a:r>
-              <a:rPr lang="en-GB" sz="3200" b="1" dirty="0" err="1"/>
-              <a:t>Monalisa</a:t>
-            </a:r>
-            <a:r>
-              <a:rPr lang="en-GB" sz="3200" b="1" dirty="0"/>
-              <a:t>: </a:t>
-            </a:r>
-            <a:r>
-              <a:rPr lang="en-GB" sz="3200" dirty="0"/>
-              <a:t>Distributed monitoring infrastructure for real time monitoring </a:t>
-            </a:r>
-            <a:r>
-              <a:rPr lang="en-GB" sz="3200" dirty="0" smtClean="0"/>
-              <a:t>of each </a:t>
-            </a:r>
-            <a:r>
-              <a:rPr lang="en-GB" sz="3200" dirty="0"/>
-              <a:t>flow, </a:t>
-            </a:r>
-            <a:r>
-              <a:rPr lang="en-GB" sz="3200" dirty="0" smtClean="0"/>
-              <a:t>transfer</a:t>
-            </a:r>
-            <a:r>
-              <a:rPr lang="en-GB" sz="3200" b="1" dirty="0" smtClean="0"/>
-              <a:t> </a:t>
-            </a:r>
-            <a:endParaRPr lang="en-GB" sz="3200" b="1" dirty="0"/>
+            <a:pPr algn="ctr"/>
+            <a:r>
+              <a:rPr lang="en-GB" sz="1600" b="1" dirty="0" err="1" smtClean="0"/>
+              <a:t>Ph</a:t>
+            </a:r>
+            <a:r>
+              <a:rPr lang="en-US" altLang="zh-CN" sz="1600" b="1" dirty="0" smtClean="0"/>
+              <a:t>EDE</a:t>
+            </a:r>
+            <a:r>
+              <a:rPr lang="en-GB" sz="1600" b="1" dirty="0" smtClean="0"/>
+              <a:t>x</a:t>
+            </a:r>
+            <a:endParaRPr lang="en-GB" sz="1600" b="1" dirty="0"/>
           </a:p>
         </p:txBody>
       </p:sp>
       <p:sp>
         <p:nvSpPr>
-          <p:cNvPr id="55" name="Rectangle 54"/>
+          <p:cNvPr id="5" name="Rounded Rectangle 4"/>
           <p:cNvSpPr/>
           <p:nvPr/>
         </p:nvSpPr>
         <p:spPr>
           <a:xfrm>
-            <a:off x="321997" y="144050"/>
-            <a:ext cx="4934621" cy="769441"/>
-          </a:xfrm>
-          <a:prstGeom prst="rect">
-            <a:avLst/>
-          </a:prstGeom>
-        </p:spPr>
+            <a:off x="7582709" y="272681"/>
+            <a:ext cx="1057658" cy="370154"/>
+          </a:xfrm>
+          <a:prstGeom prst="roundRect">
+            <a:avLst/>
+          </a:prstGeom>
+          <a:solidFill>
+            <a:srgbClr val="00B0F0"/>
+          </a:solidFill>
+          <a:effectLst>
+            <a:innerShdw blurRad="63500" dist="50800" dir="18900000">
+              <a:prstClr val="black">
+                <a:alpha val="50000"/>
+              </a:prstClr>
+            </a:innerShdw>
+          </a:effectLst>
+        </p:spPr>
+        <p:style>
+          <a:lnRef idx="2">
+            <a:schemeClr val="dk1"/>
+          </a:lnRef>
+          <a:fillRef idx="1">
+            <a:schemeClr val="lt1"/>
+          </a:fillRef>
+          <a:effectRef idx="0">
+            <a:schemeClr val="dk1"/>
+          </a:effectRef>
+          <a:fontRef idx="minor">
+            <a:schemeClr val="dk1"/>
+          </a:fontRef>
+        </p:style>
         <p:txBody>
-          <a:bodyPr wrap="none">
-            <a:spAutoFit/>
+          <a:bodyPr rtlCol="0" anchor="ctr"/>
+          <a:lstStyle/>
+          <a:p>
+            <a:pPr algn="ctr"/>
+            <a:r>
+              <a:rPr lang="en-GB" sz="1600" b="1" dirty="0"/>
+              <a:t>ASO</a:t>
+            </a:r>
+          </a:p>
+        </p:txBody>
+      </p:sp>
+      <p:sp>
+        <p:nvSpPr>
+          <p:cNvPr id="6" name="Rounded Rectangle 5"/>
+          <p:cNvSpPr/>
+          <p:nvPr/>
+        </p:nvSpPr>
+        <p:spPr>
+          <a:xfrm>
+            <a:off x="9289589" y="272681"/>
+            <a:ext cx="1057659" cy="370154"/>
+          </a:xfrm>
+          <a:prstGeom prst="roundRect">
+            <a:avLst/>
+          </a:prstGeom>
+          <a:solidFill>
+            <a:srgbClr val="00B0F0"/>
+          </a:solidFill>
+          <a:effectLst>
+            <a:innerShdw blurRad="63500" dist="50800" dir="18900000">
+              <a:prstClr val="black">
+                <a:alpha val="50000"/>
+              </a:prstClr>
+            </a:innerShdw>
+          </a:effectLst>
+        </p:spPr>
+        <p:style>
+          <a:lnRef idx="2">
+            <a:schemeClr val="dk1"/>
+          </a:lnRef>
+          <a:fillRef idx="1">
+            <a:schemeClr val="lt1"/>
+          </a:fillRef>
+          <a:effectRef idx="0">
+            <a:schemeClr val="dk1"/>
+          </a:effectRef>
+          <a:fontRef idx="minor">
+            <a:schemeClr val="dk1"/>
+          </a:fontRef>
+        </p:style>
+        <p:txBody>
+          <a:bodyPr rtlCol="0" anchor="ctr"/>
+          <a:lstStyle/>
+          <a:p>
+            <a:pPr algn="ctr"/>
+            <a:r>
+              <a:rPr lang="en-GB" sz="1600" b="1" dirty="0"/>
+              <a:t>Batch</a:t>
+            </a:r>
+          </a:p>
+        </p:txBody>
+      </p:sp>
+      <p:cxnSp>
+        <p:nvCxnSpPr>
+          <p:cNvPr id="15" name="Straight Connector 14"/>
+          <p:cNvCxnSpPr>
+            <a:stCxn id="4" idx="2"/>
+          </p:cNvCxnSpPr>
+          <p:nvPr/>
+        </p:nvCxnSpPr>
+        <p:spPr>
+          <a:xfrm flipH="1">
+            <a:off x="6401303" y="642835"/>
+            <a:ext cx="3355" cy="286130"/>
+          </a:xfrm>
+          <a:prstGeom prst="line">
+            <a:avLst/>
+          </a:prstGeom>
+          <a:ln w="38100">
+            <a:solidFill>
+              <a:schemeClr val="accent6"/>
+            </a:solidFill>
+          </a:ln>
+        </p:spPr>
+        <p:style>
+          <a:lnRef idx="1">
+            <a:schemeClr val="accent1"/>
+          </a:lnRef>
+          <a:fillRef idx="0">
+            <a:schemeClr val="accent1"/>
+          </a:fillRef>
+          <a:effectRef idx="0">
+            <a:schemeClr val="accent1"/>
+          </a:effectRef>
+          <a:fontRef idx="minor">
+            <a:schemeClr val="tx1"/>
+          </a:fontRef>
+        </p:style>
+      </p:cxnSp>
+      <p:cxnSp>
+        <p:nvCxnSpPr>
+          <p:cNvPr id="16" name="Straight Connector 15"/>
+          <p:cNvCxnSpPr/>
+          <p:nvPr/>
+        </p:nvCxnSpPr>
+        <p:spPr>
+          <a:xfrm>
+            <a:off x="8108183" y="642835"/>
+            <a:ext cx="1677" cy="487114"/>
+          </a:xfrm>
+          <a:prstGeom prst="line">
+            <a:avLst/>
+          </a:prstGeom>
+          <a:ln w="38100">
+            <a:solidFill>
+              <a:schemeClr val="accent6"/>
+            </a:solidFill>
+            <a:tailEnd type="triangle"/>
+          </a:ln>
+        </p:spPr>
+        <p:style>
+          <a:lnRef idx="1">
+            <a:schemeClr val="accent1"/>
+          </a:lnRef>
+          <a:fillRef idx="0">
+            <a:schemeClr val="accent1"/>
+          </a:fillRef>
+          <a:effectRef idx="0">
+            <a:schemeClr val="accent1"/>
+          </a:effectRef>
+          <a:fontRef idx="minor">
+            <a:schemeClr val="tx1"/>
+          </a:fontRef>
+        </p:style>
+      </p:cxnSp>
+      <p:cxnSp>
+        <p:nvCxnSpPr>
+          <p:cNvPr id="17" name="Straight Connector 16"/>
+          <p:cNvCxnSpPr/>
+          <p:nvPr/>
+        </p:nvCxnSpPr>
+        <p:spPr>
+          <a:xfrm>
+            <a:off x="9818418" y="642835"/>
+            <a:ext cx="11146" cy="286130"/>
+          </a:xfrm>
+          <a:prstGeom prst="line">
+            <a:avLst/>
+          </a:prstGeom>
+          <a:ln w="38100">
+            <a:solidFill>
+              <a:schemeClr val="accent6"/>
+            </a:solidFill>
+          </a:ln>
+        </p:spPr>
+        <p:style>
+          <a:lnRef idx="1">
+            <a:schemeClr val="accent1"/>
+          </a:lnRef>
+          <a:fillRef idx="0">
+            <a:schemeClr val="accent1"/>
+          </a:fillRef>
+          <a:effectRef idx="0">
+            <a:schemeClr val="accent1"/>
+          </a:effectRef>
+          <a:fontRef idx="minor">
+            <a:schemeClr val="tx1"/>
+          </a:fontRef>
+        </p:style>
+      </p:cxnSp>
+      <p:cxnSp>
+        <p:nvCxnSpPr>
+          <p:cNvPr id="18" name="Straight Connector 17"/>
+          <p:cNvCxnSpPr/>
+          <p:nvPr/>
+        </p:nvCxnSpPr>
+        <p:spPr>
+          <a:xfrm>
+            <a:off x="6404658" y="909733"/>
+            <a:ext cx="3413760" cy="0"/>
+          </a:xfrm>
+          <a:prstGeom prst="line">
+            <a:avLst/>
+          </a:prstGeom>
+          <a:ln w="38100">
+            <a:solidFill>
+              <a:schemeClr val="accent6"/>
+            </a:solidFill>
+          </a:ln>
+        </p:spPr>
+        <p:style>
+          <a:lnRef idx="1">
+            <a:schemeClr val="accent1"/>
+          </a:lnRef>
+          <a:fillRef idx="0">
+            <a:schemeClr val="accent1"/>
+          </a:fillRef>
+          <a:effectRef idx="0">
+            <a:schemeClr val="accent1"/>
+          </a:effectRef>
+          <a:fontRef idx="minor">
+            <a:schemeClr val="tx1"/>
+          </a:fontRef>
+        </p:style>
+      </p:cxnSp>
+      <p:grpSp>
+        <p:nvGrpSpPr>
+          <p:cNvPr id="28" name="Group 27"/>
+          <p:cNvGrpSpPr/>
+          <p:nvPr/>
+        </p:nvGrpSpPr>
+        <p:grpSpPr>
+          <a:xfrm>
+            <a:off x="7447581" y="1124526"/>
+            <a:ext cx="1321204" cy="827232"/>
+            <a:chOff x="3974592" y="1133856"/>
+            <a:chExt cx="1345588" cy="827232"/>
+          </a:xfrm>
+        </p:grpSpPr>
+        <p:sp>
+          <p:nvSpPr>
+            <p:cNvPr id="22" name="Rounded Rectangle 21"/>
+            <p:cNvSpPr/>
+            <p:nvPr/>
+          </p:nvSpPr>
+          <p:spPr>
+            <a:xfrm>
+              <a:off x="4130413" y="1133856"/>
+              <a:ext cx="1189767" cy="684800"/>
+            </a:xfrm>
+            <a:prstGeom prst="roundRect">
+              <a:avLst/>
+            </a:prstGeom>
+            <a:solidFill>
+              <a:schemeClr val="accent6">
+                <a:lumMod val="40000"/>
+                <a:lumOff val="60000"/>
+              </a:schemeClr>
+            </a:solidFill>
+            <a:effectLst>
+              <a:innerShdw blurRad="63500" dist="50800" dir="18900000">
+                <a:prstClr val="black">
+                  <a:alpha val="50000"/>
+                </a:prstClr>
+              </a:innerShdw>
+            </a:effectLst>
+          </p:spPr>
+          <p:style>
+            <a:lnRef idx="2">
+              <a:schemeClr val="dk1"/>
+            </a:lnRef>
+            <a:fillRef idx="1">
+              <a:schemeClr val="lt1"/>
+            </a:fillRef>
+            <a:effectRef idx="0">
+              <a:schemeClr val="dk1"/>
+            </a:effectRef>
+            <a:fontRef idx="minor">
+              <a:schemeClr val="dk1"/>
+            </a:fontRef>
+          </p:style>
+          <p:txBody>
+            <a:bodyPr rtlCol="0" anchor="ctr"/>
+            <a:lstStyle/>
+            <a:p>
+              <a:pPr algn="ctr"/>
+              <a:endParaRPr lang="en-GB" dirty="0"/>
+            </a:p>
+          </p:txBody>
+        </p:sp>
+        <p:sp>
+          <p:nvSpPr>
+            <p:cNvPr id="23" name="Rounded Rectangle 22"/>
+            <p:cNvSpPr/>
+            <p:nvPr/>
+          </p:nvSpPr>
+          <p:spPr>
+            <a:xfrm>
+              <a:off x="4067127" y="1211106"/>
+              <a:ext cx="1189767" cy="684800"/>
+            </a:xfrm>
+            <a:prstGeom prst="roundRect">
+              <a:avLst/>
+            </a:prstGeom>
+            <a:solidFill>
+              <a:schemeClr val="accent6">
+                <a:lumMod val="40000"/>
+                <a:lumOff val="60000"/>
+              </a:schemeClr>
+            </a:solidFill>
+            <a:effectLst>
+              <a:innerShdw blurRad="63500" dist="50800" dir="18900000">
+                <a:prstClr val="black">
+                  <a:alpha val="50000"/>
+                </a:prstClr>
+              </a:innerShdw>
+            </a:effectLst>
+          </p:spPr>
+          <p:style>
+            <a:lnRef idx="2">
+              <a:schemeClr val="dk1"/>
+            </a:lnRef>
+            <a:fillRef idx="1">
+              <a:schemeClr val="lt1"/>
+            </a:fillRef>
+            <a:effectRef idx="0">
+              <a:schemeClr val="dk1"/>
+            </a:effectRef>
+            <a:fontRef idx="minor">
+              <a:schemeClr val="dk1"/>
+            </a:fontRef>
+          </p:style>
+          <p:txBody>
+            <a:bodyPr rtlCol="0" anchor="ctr"/>
+            <a:lstStyle/>
+            <a:p>
+              <a:pPr algn="ctr"/>
+              <a:endParaRPr lang="en-GB" dirty="0"/>
+            </a:p>
+          </p:txBody>
+        </p:sp>
+        <p:sp>
+          <p:nvSpPr>
+            <p:cNvPr id="25" name="Rounded Rectangle 24"/>
+            <p:cNvSpPr/>
+            <p:nvPr/>
+          </p:nvSpPr>
+          <p:spPr>
+            <a:xfrm>
+              <a:off x="3974592" y="1276288"/>
+              <a:ext cx="1189767" cy="684800"/>
+            </a:xfrm>
+            <a:prstGeom prst="roundRect">
+              <a:avLst/>
+            </a:prstGeom>
+            <a:solidFill>
+              <a:schemeClr val="accent6">
+                <a:lumMod val="40000"/>
+                <a:lumOff val="60000"/>
+              </a:schemeClr>
+            </a:solidFill>
+            <a:effectLst>
+              <a:innerShdw blurRad="63500" dist="50800" dir="18900000">
+                <a:prstClr val="black">
+                  <a:alpha val="50000"/>
+                </a:prstClr>
+              </a:innerShdw>
+            </a:effectLst>
+          </p:spPr>
+          <p:style>
+            <a:lnRef idx="2">
+              <a:schemeClr val="dk1"/>
+            </a:lnRef>
+            <a:fillRef idx="1">
+              <a:schemeClr val="lt1"/>
+            </a:fillRef>
+            <a:effectRef idx="0">
+              <a:schemeClr val="dk1"/>
+            </a:effectRef>
+            <a:fontRef idx="minor">
+              <a:schemeClr val="dk1"/>
+            </a:fontRef>
+          </p:style>
+          <p:txBody>
+            <a:bodyPr rtlCol="0" anchor="ctr"/>
+            <a:lstStyle/>
+            <a:p>
+              <a:pPr algn="ctr"/>
+              <a:r>
+                <a:rPr lang="en-GB" sz="1600" b="1" dirty="0" err="1"/>
+                <a:t>ExaO</a:t>
+              </a:r>
+              <a:r>
+                <a:rPr lang="en-GB" sz="1600" b="1" dirty="0"/>
+                <a:t> </a:t>
+              </a:r>
+            </a:p>
+            <a:p>
+              <a:pPr algn="ctr"/>
+              <a:r>
+                <a:rPr lang="en-GB" sz="1600" b="1" dirty="0" smtClean="0"/>
+                <a:t>R</a:t>
+              </a:r>
+              <a:r>
+                <a:rPr lang="en-US" altLang="zh-CN" sz="1600" b="1" dirty="0" err="1" smtClean="0"/>
+                <a:t>ESTful</a:t>
+              </a:r>
+              <a:r>
+                <a:rPr lang="en-GB" sz="1600" b="1" dirty="0" smtClean="0"/>
+                <a:t> </a:t>
+              </a:r>
+              <a:r>
+                <a:rPr lang="en-GB" sz="1600" b="1" dirty="0"/>
+                <a:t>Interface</a:t>
+              </a:r>
+            </a:p>
+          </p:txBody>
+        </p:sp>
+      </p:grpSp>
+      <p:grpSp>
+        <p:nvGrpSpPr>
+          <p:cNvPr id="48" name="Group 47"/>
+          <p:cNvGrpSpPr/>
+          <p:nvPr/>
+        </p:nvGrpSpPr>
+        <p:grpSpPr>
+          <a:xfrm>
+            <a:off x="4913220" y="5260141"/>
+            <a:ext cx="2054145" cy="1316736"/>
+            <a:chOff x="5139484" y="4991855"/>
+            <a:chExt cx="2054145" cy="1316736"/>
+          </a:xfrm>
+        </p:grpSpPr>
+        <p:sp>
+          <p:nvSpPr>
+            <p:cNvPr id="29" name="Cloud 28"/>
+            <p:cNvSpPr/>
+            <p:nvPr/>
+          </p:nvSpPr>
+          <p:spPr>
+            <a:xfrm>
+              <a:off x="5139484" y="4991855"/>
+              <a:ext cx="2054145" cy="1316736"/>
+            </a:xfrm>
+            <a:prstGeom prst="cloud">
+              <a:avLst/>
+            </a:prstGeom>
+            <a:solidFill>
+              <a:schemeClr val="accent1">
+                <a:lumMod val="20000"/>
+                <a:lumOff val="80000"/>
+              </a:schemeClr>
+            </a:solidFill>
+          </p:spPr>
+          <p:style>
+            <a:lnRef idx="2">
+              <a:schemeClr val="accent1">
+                <a:shade val="50000"/>
+              </a:schemeClr>
+            </a:lnRef>
+            <a:fillRef idx="1">
+              <a:schemeClr val="accent1"/>
+            </a:fillRef>
+            <a:effectRef idx="0">
+              <a:schemeClr val="accent1"/>
+            </a:effectRef>
+            <a:fontRef idx="minor">
+              <a:schemeClr val="lt1"/>
+            </a:fontRef>
+          </p:style>
+          <p:txBody>
+            <a:bodyPr rtlCol="0" anchor="ctr"/>
+            <a:lstStyle/>
+            <a:p>
+              <a:pPr algn="ctr"/>
+              <a:endParaRPr lang="en-GB"/>
+            </a:p>
+          </p:txBody>
+        </p:sp>
+        <p:pic>
+          <p:nvPicPr>
+            <p:cNvPr id="31" name="Picture 30" descr="http://www.freeiconspng.com/uploads/server-storage-icon-15.png"/>
+            <p:cNvPicPr>
+              <a:picLocks noChangeAspect="1" noChangeArrowheads="1"/>
+            </p:cNvPicPr>
+            <p:nvPr/>
+          </p:nvPicPr>
+          <p:blipFill>
+            <a:blip r:embed="rId2" cstate="print">
+              <a:extLst>
+                <a:ext uri="{28A0092B-C50C-407E-A947-70E740481C1C}">
+                  <a14:useLocalDpi xmlns:a14="http://schemas.microsoft.com/office/drawing/2010/main" val="0"/>
+                </a:ext>
+              </a:extLst>
+            </a:blip>
+            <a:srcRect/>
+            <a:stretch>
+              <a:fillRect/>
+            </a:stretch>
+          </p:blipFill>
+          <p:spPr bwMode="auto">
+            <a:xfrm>
+              <a:off x="6546972" y="5620277"/>
+              <a:ext cx="386232" cy="360915"/>
+            </a:xfrm>
+            <a:prstGeom prst="rect">
+              <a:avLst/>
+            </a:prstGeom>
+            <a:noFill/>
+            <a:extLst>
+              <a:ext uri="{909E8E84-426E-40DD-AFC4-6F175D3DCCD1}">
+                <a14:hiddenFill xmlns:a14="http://schemas.microsoft.com/office/drawing/2010/main">
+                  <a:solidFill>
+                    <a:srgbClr val="FFFFFF"/>
+                  </a:solidFill>
+                </a14:hiddenFill>
+              </a:ext>
+            </a:extLst>
+          </p:spPr>
+        </p:pic>
+        <p:sp>
+          <p:nvSpPr>
+            <p:cNvPr id="45" name="Rectangle 44"/>
+            <p:cNvSpPr/>
+            <p:nvPr/>
+          </p:nvSpPr>
+          <p:spPr>
+            <a:xfrm>
+              <a:off x="5497284" y="5674404"/>
+              <a:ext cx="1035271" cy="252662"/>
+            </a:xfrm>
+            <a:prstGeom prst="rect">
+              <a:avLst/>
+            </a:prstGeom>
+            <a:solidFill>
+              <a:schemeClr val="accent4">
+                <a:lumMod val="40000"/>
+                <a:lumOff val="60000"/>
+              </a:schemeClr>
+            </a:solidFill>
+            <a:effectLst/>
+          </p:spPr>
+          <p:style>
+            <a:lnRef idx="2">
+              <a:schemeClr val="accent1">
+                <a:shade val="50000"/>
+              </a:schemeClr>
+            </a:lnRef>
+            <a:fillRef idx="1">
+              <a:schemeClr val="accent1"/>
+            </a:fillRef>
+            <a:effectRef idx="0">
+              <a:schemeClr val="accent1"/>
+            </a:effectRef>
+            <a:fontRef idx="minor">
+              <a:schemeClr val="lt1"/>
+            </a:fontRef>
+          </p:style>
+          <p:txBody>
+            <a:bodyPr rtlCol="0" anchor="ctr"/>
+            <a:lstStyle/>
+            <a:p>
+              <a:pPr algn="ctr"/>
+              <a:r>
+                <a:rPr lang="en-US" altLang="zh-CN" sz="1200" b="1" dirty="0" err="1" smtClean="0">
+                  <a:solidFill>
+                    <a:schemeClr val="tx1"/>
+                  </a:solidFill>
+                </a:rPr>
+                <a:t>MLSensor</a:t>
+              </a:r>
+              <a:endParaRPr lang="en-US" sz="1200" b="1" dirty="0">
+                <a:solidFill>
+                  <a:schemeClr val="tx1"/>
+                </a:solidFill>
+              </a:endParaRPr>
+            </a:p>
+          </p:txBody>
+        </p:sp>
+        <p:sp>
+          <p:nvSpPr>
+            <p:cNvPr id="46" name="Rectangle 45"/>
+            <p:cNvSpPr/>
+            <p:nvPr/>
+          </p:nvSpPr>
+          <p:spPr>
+            <a:xfrm>
+              <a:off x="5365099" y="5367615"/>
+              <a:ext cx="1299640" cy="252662"/>
+            </a:xfrm>
+            <a:prstGeom prst="rect">
+              <a:avLst/>
+            </a:prstGeom>
+            <a:solidFill>
+              <a:schemeClr val="accent4">
+                <a:lumMod val="40000"/>
+                <a:lumOff val="60000"/>
+              </a:schemeClr>
+            </a:solidFill>
+            <a:effectLst/>
+          </p:spPr>
+          <p:style>
+            <a:lnRef idx="2">
+              <a:schemeClr val="accent1">
+                <a:shade val="50000"/>
+              </a:schemeClr>
+            </a:lnRef>
+            <a:fillRef idx="1">
+              <a:schemeClr val="accent1"/>
+            </a:fillRef>
+            <a:effectRef idx="0">
+              <a:schemeClr val="accent1"/>
+            </a:effectRef>
+            <a:fontRef idx="minor">
+              <a:schemeClr val="lt1"/>
+            </a:fontRef>
+          </p:style>
+          <p:txBody>
+            <a:bodyPr rtlCol="0" anchor="ctr"/>
+            <a:lstStyle/>
+            <a:p>
+              <a:pPr algn="ctr"/>
+              <a:r>
+                <a:rPr lang="en-US" altLang="zh-CN" sz="1200" b="1" dirty="0" err="1" smtClean="0">
+                  <a:solidFill>
+                    <a:schemeClr val="tx1"/>
+                  </a:solidFill>
+                </a:rPr>
+                <a:t>FDTDaemon</a:t>
+              </a:r>
+              <a:endParaRPr lang="en-US" sz="1200" b="1" dirty="0">
+                <a:solidFill>
+                  <a:schemeClr val="tx1"/>
+                </a:solidFill>
+              </a:endParaRPr>
+            </a:p>
+          </p:txBody>
+        </p:sp>
+      </p:grpSp>
+      <p:grpSp>
+        <p:nvGrpSpPr>
+          <p:cNvPr id="49" name="Group 48"/>
+          <p:cNvGrpSpPr/>
+          <p:nvPr/>
+        </p:nvGrpSpPr>
+        <p:grpSpPr>
+          <a:xfrm>
+            <a:off x="7220201" y="5239341"/>
+            <a:ext cx="2054145" cy="1316736"/>
+            <a:chOff x="5139484" y="4991855"/>
+            <a:chExt cx="2054145" cy="1316736"/>
+          </a:xfrm>
+        </p:grpSpPr>
+        <p:sp>
+          <p:nvSpPr>
+            <p:cNvPr id="50" name="Cloud 49"/>
+            <p:cNvSpPr/>
+            <p:nvPr/>
+          </p:nvSpPr>
+          <p:spPr>
+            <a:xfrm>
+              <a:off x="5139484" y="4991855"/>
+              <a:ext cx="2054145" cy="1316736"/>
+            </a:xfrm>
+            <a:prstGeom prst="cloud">
+              <a:avLst/>
+            </a:prstGeom>
+            <a:solidFill>
+              <a:schemeClr val="accent1">
+                <a:lumMod val="20000"/>
+                <a:lumOff val="80000"/>
+              </a:schemeClr>
+            </a:solidFill>
+          </p:spPr>
+          <p:style>
+            <a:lnRef idx="2">
+              <a:schemeClr val="accent1">
+                <a:shade val="50000"/>
+              </a:schemeClr>
+            </a:lnRef>
+            <a:fillRef idx="1">
+              <a:schemeClr val="accent1"/>
+            </a:fillRef>
+            <a:effectRef idx="0">
+              <a:schemeClr val="accent1"/>
+            </a:effectRef>
+            <a:fontRef idx="minor">
+              <a:schemeClr val="lt1"/>
+            </a:fontRef>
+          </p:style>
+          <p:txBody>
+            <a:bodyPr rtlCol="0" anchor="ctr"/>
+            <a:lstStyle/>
+            <a:p>
+              <a:pPr algn="ctr"/>
+              <a:endParaRPr lang="en-GB"/>
+            </a:p>
+          </p:txBody>
+        </p:sp>
+        <p:pic>
+          <p:nvPicPr>
+            <p:cNvPr id="51" name="Picture 50" descr="http://www.freeiconspng.com/uploads/server-storage-icon-15.png"/>
+            <p:cNvPicPr>
+              <a:picLocks noChangeAspect="1" noChangeArrowheads="1"/>
+            </p:cNvPicPr>
+            <p:nvPr/>
+          </p:nvPicPr>
+          <p:blipFill>
+            <a:blip r:embed="rId2" cstate="print">
+              <a:extLst>
+                <a:ext uri="{28A0092B-C50C-407E-A947-70E740481C1C}">
+                  <a14:useLocalDpi xmlns:a14="http://schemas.microsoft.com/office/drawing/2010/main" val="0"/>
+                </a:ext>
+              </a:extLst>
+            </a:blip>
+            <a:srcRect/>
+            <a:stretch>
+              <a:fillRect/>
+            </a:stretch>
+          </p:blipFill>
+          <p:spPr bwMode="auto">
+            <a:xfrm>
+              <a:off x="6546972" y="5620277"/>
+              <a:ext cx="386232" cy="360915"/>
+            </a:xfrm>
+            <a:prstGeom prst="rect">
+              <a:avLst/>
+            </a:prstGeom>
+            <a:noFill/>
+            <a:extLst>
+              <a:ext uri="{909E8E84-426E-40DD-AFC4-6F175D3DCCD1}">
+                <a14:hiddenFill xmlns:a14="http://schemas.microsoft.com/office/drawing/2010/main">
+                  <a:solidFill>
+                    <a:srgbClr val="FFFFFF"/>
+                  </a:solidFill>
+                </a14:hiddenFill>
+              </a:ext>
+            </a:extLst>
+          </p:spPr>
+        </p:pic>
+        <p:sp>
+          <p:nvSpPr>
+            <p:cNvPr id="53" name="Rectangle 52"/>
+            <p:cNvSpPr/>
+            <p:nvPr/>
+          </p:nvSpPr>
+          <p:spPr>
+            <a:xfrm>
+              <a:off x="5497284" y="5674404"/>
+              <a:ext cx="1035271" cy="252662"/>
+            </a:xfrm>
+            <a:prstGeom prst="rect">
+              <a:avLst/>
+            </a:prstGeom>
+            <a:solidFill>
+              <a:schemeClr val="accent4">
+                <a:lumMod val="40000"/>
+                <a:lumOff val="60000"/>
+              </a:schemeClr>
+            </a:solidFill>
+            <a:effectLst/>
+          </p:spPr>
+          <p:style>
+            <a:lnRef idx="2">
+              <a:schemeClr val="accent1">
+                <a:shade val="50000"/>
+              </a:schemeClr>
+            </a:lnRef>
+            <a:fillRef idx="1">
+              <a:schemeClr val="accent1"/>
+            </a:fillRef>
+            <a:effectRef idx="0">
+              <a:schemeClr val="accent1"/>
+            </a:effectRef>
+            <a:fontRef idx="minor">
+              <a:schemeClr val="lt1"/>
+            </a:fontRef>
+          </p:style>
+          <p:txBody>
+            <a:bodyPr rtlCol="0" anchor="ctr"/>
+            <a:lstStyle/>
+            <a:p>
+              <a:pPr algn="ctr"/>
+              <a:r>
+                <a:rPr lang="en-US" altLang="zh-CN" sz="1200" b="1" dirty="0" err="1" smtClean="0">
+                  <a:solidFill>
+                    <a:schemeClr val="tx1"/>
+                  </a:solidFill>
+                </a:rPr>
+                <a:t>MLSensor</a:t>
+              </a:r>
+              <a:endParaRPr lang="en-US" sz="1200" b="1" dirty="0">
+                <a:solidFill>
+                  <a:schemeClr val="tx1"/>
+                </a:solidFill>
+              </a:endParaRPr>
+            </a:p>
+          </p:txBody>
+        </p:sp>
+        <p:sp>
+          <p:nvSpPr>
+            <p:cNvPr id="54" name="Rectangle 53"/>
+            <p:cNvSpPr/>
+            <p:nvPr/>
+          </p:nvSpPr>
+          <p:spPr>
+            <a:xfrm>
+              <a:off x="5365099" y="5367615"/>
+              <a:ext cx="1299640" cy="252662"/>
+            </a:xfrm>
+            <a:prstGeom prst="rect">
+              <a:avLst/>
+            </a:prstGeom>
+            <a:solidFill>
+              <a:schemeClr val="accent4">
+                <a:lumMod val="40000"/>
+                <a:lumOff val="60000"/>
+              </a:schemeClr>
+            </a:solidFill>
+            <a:effectLst/>
+          </p:spPr>
+          <p:style>
+            <a:lnRef idx="2">
+              <a:schemeClr val="accent1">
+                <a:shade val="50000"/>
+              </a:schemeClr>
+            </a:lnRef>
+            <a:fillRef idx="1">
+              <a:schemeClr val="accent1"/>
+            </a:fillRef>
+            <a:effectRef idx="0">
+              <a:schemeClr val="accent1"/>
+            </a:effectRef>
+            <a:fontRef idx="minor">
+              <a:schemeClr val="lt1"/>
+            </a:fontRef>
+          </p:style>
+          <p:txBody>
+            <a:bodyPr rtlCol="0" anchor="ctr"/>
+            <a:lstStyle/>
+            <a:p>
+              <a:pPr algn="ctr"/>
+              <a:r>
+                <a:rPr lang="en-US" altLang="zh-CN" sz="1200" b="1" dirty="0" err="1" smtClean="0">
+                  <a:solidFill>
+                    <a:schemeClr val="tx1"/>
+                  </a:solidFill>
+                </a:rPr>
+                <a:t>FDTDaemon</a:t>
+              </a:r>
+              <a:endParaRPr lang="en-US" sz="1200" b="1" dirty="0">
+                <a:solidFill>
+                  <a:schemeClr val="tx1"/>
+                </a:solidFill>
+              </a:endParaRPr>
+            </a:p>
+          </p:txBody>
+        </p:sp>
+      </p:grpSp>
+      <p:grpSp>
+        <p:nvGrpSpPr>
+          <p:cNvPr id="58" name="Group 57"/>
+          <p:cNvGrpSpPr/>
+          <p:nvPr/>
+        </p:nvGrpSpPr>
+        <p:grpSpPr>
+          <a:xfrm>
+            <a:off x="9592803" y="5239341"/>
+            <a:ext cx="2054145" cy="1316736"/>
+            <a:chOff x="5139484" y="4991855"/>
+            <a:chExt cx="2054145" cy="1316736"/>
+          </a:xfrm>
+        </p:grpSpPr>
+        <p:sp>
+          <p:nvSpPr>
+            <p:cNvPr id="59" name="Cloud 58"/>
+            <p:cNvSpPr/>
+            <p:nvPr/>
+          </p:nvSpPr>
+          <p:spPr>
+            <a:xfrm>
+              <a:off x="5139484" y="4991855"/>
+              <a:ext cx="2054145" cy="1316736"/>
+            </a:xfrm>
+            <a:prstGeom prst="cloud">
+              <a:avLst/>
+            </a:prstGeom>
+            <a:solidFill>
+              <a:schemeClr val="accent1">
+                <a:lumMod val="20000"/>
+                <a:lumOff val="80000"/>
+              </a:schemeClr>
+            </a:solidFill>
+          </p:spPr>
+          <p:style>
+            <a:lnRef idx="2">
+              <a:schemeClr val="accent1">
+                <a:shade val="50000"/>
+              </a:schemeClr>
+            </a:lnRef>
+            <a:fillRef idx="1">
+              <a:schemeClr val="accent1"/>
+            </a:fillRef>
+            <a:effectRef idx="0">
+              <a:schemeClr val="accent1"/>
+            </a:effectRef>
+            <a:fontRef idx="minor">
+              <a:schemeClr val="lt1"/>
+            </a:fontRef>
+          </p:style>
+          <p:txBody>
+            <a:bodyPr rtlCol="0" anchor="ctr"/>
+            <a:lstStyle/>
+            <a:p>
+              <a:pPr algn="ctr"/>
+              <a:endParaRPr lang="en-GB"/>
+            </a:p>
+          </p:txBody>
+        </p:sp>
+        <p:pic>
+          <p:nvPicPr>
+            <p:cNvPr id="60" name="Picture 59" descr="http://www.freeiconspng.com/uploads/server-storage-icon-15.png"/>
+            <p:cNvPicPr>
+              <a:picLocks noChangeAspect="1" noChangeArrowheads="1"/>
+            </p:cNvPicPr>
+            <p:nvPr/>
+          </p:nvPicPr>
+          <p:blipFill>
+            <a:blip r:embed="rId2" cstate="print">
+              <a:extLst>
+                <a:ext uri="{28A0092B-C50C-407E-A947-70E740481C1C}">
+                  <a14:useLocalDpi xmlns:a14="http://schemas.microsoft.com/office/drawing/2010/main" val="0"/>
+                </a:ext>
+              </a:extLst>
+            </a:blip>
+            <a:srcRect/>
+            <a:stretch>
+              <a:fillRect/>
+            </a:stretch>
+          </p:blipFill>
+          <p:spPr bwMode="auto">
+            <a:xfrm>
+              <a:off x="6546972" y="5620277"/>
+              <a:ext cx="386232" cy="360915"/>
+            </a:xfrm>
+            <a:prstGeom prst="rect">
+              <a:avLst/>
+            </a:prstGeom>
+            <a:noFill/>
+            <a:extLst>
+              <a:ext uri="{909E8E84-426E-40DD-AFC4-6F175D3DCCD1}">
+                <a14:hiddenFill xmlns:a14="http://schemas.microsoft.com/office/drawing/2010/main">
+                  <a:solidFill>
+                    <a:srgbClr val="FFFFFF"/>
+                  </a:solidFill>
+                </a14:hiddenFill>
+              </a:ext>
+            </a:extLst>
+          </p:spPr>
+        </p:pic>
+        <p:sp>
+          <p:nvSpPr>
+            <p:cNvPr id="62" name="Rectangle 61"/>
+            <p:cNvSpPr/>
+            <p:nvPr/>
+          </p:nvSpPr>
+          <p:spPr>
+            <a:xfrm>
+              <a:off x="5497284" y="5674404"/>
+              <a:ext cx="1035271" cy="252662"/>
+            </a:xfrm>
+            <a:prstGeom prst="rect">
+              <a:avLst/>
+            </a:prstGeom>
+            <a:solidFill>
+              <a:schemeClr val="accent4">
+                <a:lumMod val="40000"/>
+                <a:lumOff val="60000"/>
+              </a:schemeClr>
+            </a:solidFill>
+            <a:effectLst/>
+          </p:spPr>
+          <p:style>
+            <a:lnRef idx="2">
+              <a:schemeClr val="accent1">
+                <a:shade val="50000"/>
+              </a:schemeClr>
+            </a:lnRef>
+            <a:fillRef idx="1">
+              <a:schemeClr val="accent1"/>
+            </a:fillRef>
+            <a:effectRef idx="0">
+              <a:schemeClr val="accent1"/>
+            </a:effectRef>
+            <a:fontRef idx="minor">
+              <a:schemeClr val="lt1"/>
+            </a:fontRef>
+          </p:style>
+          <p:txBody>
+            <a:bodyPr rtlCol="0" anchor="ctr"/>
+            <a:lstStyle/>
+            <a:p>
+              <a:pPr algn="ctr"/>
+              <a:r>
+                <a:rPr lang="en-US" altLang="zh-CN" sz="1200" b="1" dirty="0" err="1" smtClean="0">
+                  <a:solidFill>
+                    <a:schemeClr val="tx1"/>
+                  </a:solidFill>
+                </a:rPr>
+                <a:t>MLSensor</a:t>
+              </a:r>
+              <a:endParaRPr lang="en-US" sz="1200" b="1" dirty="0">
+                <a:solidFill>
+                  <a:schemeClr val="tx1"/>
+                </a:solidFill>
+              </a:endParaRPr>
+            </a:p>
+          </p:txBody>
+        </p:sp>
+        <p:sp>
+          <p:nvSpPr>
+            <p:cNvPr id="63" name="Rectangle 62"/>
+            <p:cNvSpPr/>
+            <p:nvPr/>
+          </p:nvSpPr>
+          <p:spPr>
+            <a:xfrm>
+              <a:off x="5365099" y="5367615"/>
+              <a:ext cx="1299640" cy="252662"/>
+            </a:xfrm>
+            <a:prstGeom prst="rect">
+              <a:avLst/>
+            </a:prstGeom>
+            <a:solidFill>
+              <a:schemeClr val="accent4">
+                <a:lumMod val="40000"/>
+                <a:lumOff val="60000"/>
+              </a:schemeClr>
+            </a:solidFill>
+            <a:effectLst/>
+          </p:spPr>
+          <p:style>
+            <a:lnRef idx="2">
+              <a:schemeClr val="accent1">
+                <a:shade val="50000"/>
+              </a:schemeClr>
+            </a:lnRef>
+            <a:fillRef idx="1">
+              <a:schemeClr val="accent1"/>
+            </a:fillRef>
+            <a:effectRef idx="0">
+              <a:schemeClr val="accent1"/>
+            </a:effectRef>
+            <a:fontRef idx="minor">
+              <a:schemeClr val="lt1"/>
+            </a:fontRef>
+          </p:style>
+          <p:txBody>
+            <a:bodyPr rtlCol="0" anchor="ctr"/>
+            <a:lstStyle/>
+            <a:p>
+              <a:pPr algn="ctr"/>
+              <a:r>
+                <a:rPr lang="en-US" altLang="zh-CN" sz="1200" b="1" dirty="0" err="1" smtClean="0">
+                  <a:solidFill>
+                    <a:schemeClr val="tx1"/>
+                  </a:solidFill>
+                </a:rPr>
+                <a:t>FDTDaemon</a:t>
+              </a:r>
+              <a:endParaRPr lang="en-US" sz="1200" b="1" dirty="0">
+                <a:solidFill>
+                  <a:schemeClr val="tx1"/>
+                </a:solidFill>
+              </a:endParaRPr>
+            </a:p>
+          </p:txBody>
+        </p:sp>
+      </p:grpSp>
+      <p:grpSp>
+        <p:nvGrpSpPr>
+          <p:cNvPr id="67" name="Group 66"/>
+          <p:cNvGrpSpPr/>
+          <p:nvPr/>
+        </p:nvGrpSpPr>
+        <p:grpSpPr>
+          <a:xfrm>
+            <a:off x="9972548" y="1222952"/>
+            <a:ext cx="1294653" cy="725427"/>
+            <a:chOff x="4156031" y="2354387"/>
+            <a:chExt cx="413656" cy="552203"/>
+          </a:xfrm>
+        </p:grpSpPr>
+        <p:sp>
+          <p:nvSpPr>
+            <p:cNvPr id="68" name="Can 67"/>
+            <p:cNvSpPr/>
+            <p:nvPr/>
+          </p:nvSpPr>
+          <p:spPr>
+            <a:xfrm>
+              <a:off x="4278741" y="2354387"/>
+              <a:ext cx="290946" cy="449283"/>
+            </a:xfrm>
+            <a:prstGeom prst="can">
+              <a:avLst/>
+            </a:prstGeom>
+          </p:spPr>
+          <p:style>
+            <a:lnRef idx="1">
+              <a:schemeClr val="accent1"/>
+            </a:lnRef>
+            <a:fillRef idx="2">
+              <a:schemeClr val="accent1"/>
+            </a:fillRef>
+            <a:effectRef idx="1">
+              <a:schemeClr val="accent1"/>
+            </a:effectRef>
+            <a:fontRef idx="minor">
+              <a:schemeClr val="dk1"/>
+            </a:fontRef>
+          </p:style>
+          <p:txBody>
+            <a:bodyPr rtlCol="0" anchor="ctr"/>
+            <a:lstStyle/>
+            <a:p>
+              <a:pPr algn="ctr"/>
+              <a:endParaRPr lang="en-GB"/>
+            </a:p>
+          </p:txBody>
+        </p:sp>
+        <p:sp>
+          <p:nvSpPr>
+            <p:cNvPr id="69" name="Can 68"/>
+            <p:cNvSpPr/>
+            <p:nvPr/>
+          </p:nvSpPr>
+          <p:spPr>
+            <a:xfrm>
+              <a:off x="4217386" y="2405847"/>
+              <a:ext cx="290946" cy="449283"/>
+            </a:xfrm>
+            <a:prstGeom prst="can">
+              <a:avLst/>
+            </a:prstGeom>
+          </p:spPr>
+          <p:style>
+            <a:lnRef idx="1">
+              <a:schemeClr val="accent1"/>
+            </a:lnRef>
+            <a:fillRef idx="2">
+              <a:schemeClr val="accent1"/>
+            </a:fillRef>
+            <a:effectRef idx="1">
+              <a:schemeClr val="accent1"/>
+            </a:effectRef>
+            <a:fontRef idx="minor">
+              <a:schemeClr val="dk1"/>
+            </a:fontRef>
+          </p:style>
+          <p:txBody>
+            <a:bodyPr rtlCol="0" anchor="ctr"/>
+            <a:lstStyle/>
+            <a:p>
+              <a:pPr algn="ctr"/>
+              <a:endParaRPr lang="en-GB"/>
+            </a:p>
+          </p:txBody>
+        </p:sp>
+        <p:sp>
+          <p:nvSpPr>
+            <p:cNvPr id="70" name="Can 69"/>
+            <p:cNvSpPr/>
+            <p:nvPr/>
+          </p:nvSpPr>
+          <p:spPr>
+            <a:xfrm>
+              <a:off x="4156031" y="2457307"/>
+              <a:ext cx="290946" cy="449283"/>
+            </a:xfrm>
+            <a:prstGeom prst="can">
+              <a:avLst/>
+            </a:prstGeom>
+          </p:spPr>
+          <p:style>
+            <a:lnRef idx="1">
+              <a:schemeClr val="accent1"/>
+            </a:lnRef>
+            <a:fillRef idx="2">
+              <a:schemeClr val="accent1"/>
+            </a:fillRef>
+            <a:effectRef idx="1">
+              <a:schemeClr val="accent1"/>
+            </a:effectRef>
+            <a:fontRef idx="minor">
+              <a:schemeClr val="dk1"/>
+            </a:fontRef>
+          </p:style>
+          <p:txBody>
+            <a:bodyPr rtlCol="0" anchor="ctr"/>
+            <a:lstStyle/>
+            <a:p>
+              <a:pPr algn="ctr"/>
+              <a:r>
+                <a:rPr lang="en-US" altLang="zh-CN" sz="1400" b="1" dirty="0" smtClean="0"/>
+                <a:t>Database</a:t>
+              </a:r>
+              <a:endParaRPr lang="en-GB" sz="1400" b="1" dirty="0"/>
+            </a:p>
+          </p:txBody>
+        </p:sp>
+      </p:grpSp>
+      <p:grpSp>
+        <p:nvGrpSpPr>
+          <p:cNvPr id="74" name="Group 73"/>
+          <p:cNvGrpSpPr/>
+          <p:nvPr/>
+        </p:nvGrpSpPr>
+        <p:grpSpPr>
+          <a:xfrm>
+            <a:off x="6199882" y="2420246"/>
+            <a:ext cx="1395869" cy="625165"/>
+            <a:chOff x="5699875" y="2691059"/>
+            <a:chExt cx="1462053" cy="978716"/>
+          </a:xfrm>
+        </p:grpSpPr>
+        <p:sp>
+          <p:nvSpPr>
+            <p:cNvPr id="71" name="Rounded Rectangle 70"/>
+            <p:cNvSpPr/>
+            <p:nvPr/>
+          </p:nvSpPr>
+          <p:spPr>
+            <a:xfrm>
+              <a:off x="5880972" y="2691059"/>
+              <a:ext cx="1280956" cy="824335"/>
+            </a:xfrm>
+            <a:prstGeom prst="roundRect">
+              <a:avLst/>
+            </a:prstGeom>
+            <a:solidFill>
+              <a:schemeClr val="accent4">
+                <a:lumMod val="40000"/>
+                <a:lumOff val="60000"/>
+              </a:schemeClr>
+            </a:solidFill>
+            <a:effectLst>
+              <a:innerShdw blurRad="63500" dist="50800" dir="18900000">
+                <a:prstClr val="black">
+                  <a:alpha val="50000"/>
+                </a:prstClr>
+              </a:innerShdw>
+            </a:effectLst>
+          </p:spPr>
+          <p:style>
+            <a:lnRef idx="2">
+              <a:schemeClr val="dk1"/>
+            </a:lnRef>
+            <a:fillRef idx="1">
+              <a:schemeClr val="lt1"/>
+            </a:fillRef>
+            <a:effectRef idx="0">
+              <a:schemeClr val="dk1"/>
+            </a:effectRef>
+            <a:fontRef idx="minor">
+              <a:schemeClr val="dk1"/>
+            </a:fontRef>
+          </p:style>
+          <p:txBody>
+            <a:bodyPr rtlCol="0" anchor="ctr"/>
+            <a:lstStyle/>
+            <a:p>
+              <a:pPr algn="ctr"/>
+              <a:endParaRPr lang="en-GB" dirty="0"/>
+            </a:p>
+          </p:txBody>
+        </p:sp>
+        <p:sp>
+          <p:nvSpPr>
+            <p:cNvPr id="72" name="Rounded Rectangle 71"/>
+            <p:cNvSpPr/>
+            <p:nvPr/>
+          </p:nvSpPr>
+          <p:spPr>
+            <a:xfrm>
+              <a:off x="5796854" y="2765282"/>
+              <a:ext cx="1280956" cy="824335"/>
+            </a:xfrm>
+            <a:prstGeom prst="roundRect">
+              <a:avLst/>
+            </a:prstGeom>
+            <a:solidFill>
+              <a:schemeClr val="accent4">
+                <a:lumMod val="40000"/>
+                <a:lumOff val="60000"/>
+              </a:schemeClr>
+            </a:solidFill>
+            <a:effectLst>
+              <a:innerShdw blurRad="63500" dist="50800" dir="18900000">
+                <a:prstClr val="black">
+                  <a:alpha val="50000"/>
+                </a:prstClr>
+              </a:innerShdw>
+            </a:effectLst>
+          </p:spPr>
+          <p:style>
+            <a:lnRef idx="2">
+              <a:schemeClr val="dk1"/>
+            </a:lnRef>
+            <a:fillRef idx="1">
+              <a:schemeClr val="lt1"/>
+            </a:fillRef>
+            <a:effectRef idx="0">
+              <a:schemeClr val="dk1"/>
+            </a:effectRef>
+            <a:fontRef idx="minor">
+              <a:schemeClr val="dk1"/>
+            </a:fontRef>
+          </p:style>
+          <p:txBody>
+            <a:bodyPr rtlCol="0" anchor="ctr"/>
+            <a:lstStyle/>
+            <a:p>
+              <a:pPr algn="ctr"/>
+              <a:endParaRPr lang="en-GB" dirty="0"/>
+            </a:p>
+          </p:txBody>
+        </p:sp>
+        <p:sp>
+          <p:nvSpPr>
+            <p:cNvPr id="73" name="Rounded Rectangle 72"/>
+            <p:cNvSpPr/>
+            <p:nvPr/>
+          </p:nvSpPr>
+          <p:spPr>
+            <a:xfrm>
+              <a:off x="5699875" y="2845440"/>
+              <a:ext cx="1280956" cy="824335"/>
+            </a:xfrm>
+            <a:prstGeom prst="roundRect">
+              <a:avLst/>
+            </a:prstGeom>
+            <a:solidFill>
+              <a:schemeClr val="accent4">
+                <a:lumMod val="40000"/>
+                <a:lumOff val="60000"/>
+              </a:schemeClr>
+            </a:solidFill>
+            <a:effectLst>
+              <a:innerShdw blurRad="63500" dist="50800" dir="18900000">
+                <a:prstClr val="black">
+                  <a:alpha val="50000"/>
+                </a:prstClr>
+              </a:innerShdw>
+            </a:effectLst>
+          </p:spPr>
+          <p:style>
+            <a:lnRef idx="2">
+              <a:schemeClr val="dk1"/>
+            </a:lnRef>
+            <a:fillRef idx="1">
+              <a:schemeClr val="lt1"/>
+            </a:fillRef>
+            <a:effectRef idx="0">
+              <a:schemeClr val="dk1"/>
+            </a:effectRef>
+            <a:fontRef idx="minor">
+              <a:schemeClr val="dk1"/>
+            </a:fontRef>
+          </p:style>
+          <p:txBody>
+            <a:bodyPr rtlCol="0" anchor="ctr"/>
+            <a:lstStyle/>
+            <a:p>
+              <a:pPr algn="ctr"/>
+              <a:r>
+                <a:rPr lang="en-GB" sz="1600" b="1" dirty="0"/>
+                <a:t>Scheduler</a:t>
+              </a:r>
+            </a:p>
+          </p:txBody>
+        </p:sp>
+      </p:grpSp>
+      <p:grpSp>
+        <p:nvGrpSpPr>
+          <p:cNvPr id="78" name="Group 77"/>
+          <p:cNvGrpSpPr/>
+          <p:nvPr/>
+        </p:nvGrpSpPr>
+        <p:grpSpPr>
+          <a:xfrm>
+            <a:off x="8627689" y="2249707"/>
+            <a:ext cx="1410193" cy="923834"/>
+            <a:chOff x="5594690" y="2367004"/>
+            <a:chExt cx="1421149" cy="1077804"/>
+          </a:xfrm>
+        </p:grpSpPr>
+        <p:sp>
+          <p:nvSpPr>
+            <p:cNvPr id="75" name="Rounded Rectangle 74"/>
+            <p:cNvSpPr/>
+            <p:nvPr/>
+          </p:nvSpPr>
+          <p:spPr>
+            <a:xfrm>
+              <a:off x="5741758" y="2367004"/>
+              <a:ext cx="1274081" cy="913212"/>
+            </a:xfrm>
+            <a:prstGeom prst="roundRect">
+              <a:avLst/>
+            </a:prstGeom>
+            <a:solidFill>
+              <a:schemeClr val="accent4">
+                <a:lumMod val="40000"/>
+                <a:lumOff val="60000"/>
+              </a:schemeClr>
+            </a:solidFill>
+            <a:effectLst>
+              <a:innerShdw blurRad="63500" dist="50800" dir="18900000">
+                <a:prstClr val="black">
+                  <a:alpha val="50000"/>
+                </a:prstClr>
+              </a:innerShdw>
+            </a:effectLst>
+          </p:spPr>
+          <p:style>
+            <a:lnRef idx="2">
+              <a:schemeClr val="dk1"/>
+            </a:lnRef>
+            <a:fillRef idx="1">
+              <a:schemeClr val="lt1"/>
+            </a:fillRef>
+            <a:effectRef idx="0">
+              <a:schemeClr val="dk1"/>
+            </a:effectRef>
+            <a:fontRef idx="minor">
+              <a:schemeClr val="dk1"/>
+            </a:fontRef>
+          </p:style>
+          <p:txBody>
+            <a:bodyPr rtlCol="0" anchor="ctr"/>
+            <a:lstStyle/>
+            <a:p>
+              <a:pPr algn="ctr"/>
+              <a:endParaRPr lang="en-GB" dirty="0"/>
+            </a:p>
+          </p:txBody>
+        </p:sp>
+        <p:sp>
+          <p:nvSpPr>
+            <p:cNvPr id="76" name="Rounded Rectangle 75"/>
+            <p:cNvSpPr/>
+            <p:nvPr/>
+          </p:nvSpPr>
+          <p:spPr>
+            <a:xfrm>
+              <a:off x="5676657" y="2440696"/>
+              <a:ext cx="1274081" cy="913212"/>
+            </a:xfrm>
+            <a:prstGeom prst="roundRect">
+              <a:avLst/>
+            </a:prstGeom>
+            <a:solidFill>
+              <a:schemeClr val="accent4">
+                <a:lumMod val="40000"/>
+                <a:lumOff val="60000"/>
+              </a:schemeClr>
+            </a:solidFill>
+            <a:effectLst>
+              <a:innerShdw blurRad="63500" dist="50800" dir="18900000">
+                <a:prstClr val="black">
+                  <a:alpha val="50000"/>
+                </a:prstClr>
+              </a:innerShdw>
+            </a:effectLst>
+          </p:spPr>
+          <p:style>
+            <a:lnRef idx="2">
+              <a:schemeClr val="dk1"/>
+            </a:lnRef>
+            <a:fillRef idx="1">
+              <a:schemeClr val="lt1"/>
+            </a:fillRef>
+            <a:effectRef idx="0">
+              <a:schemeClr val="dk1"/>
+            </a:effectRef>
+            <a:fontRef idx="minor">
+              <a:schemeClr val="dk1"/>
+            </a:fontRef>
+          </p:style>
+          <p:txBody>
+            <a:bodyPr rtlCol="0" anchor="ctr"/>
+            <a:lstStyle/>
+            <a:p>
+              <a:pPr algn="ctr"/>
+              <a:endParaRPr lang="en-GB" dirty="0"/>
+            </a:p>
+          </p:txBody>
+        </p:sp>
+        <p:sp>
+          <p:nvSpPr>
+            <p:cNvPr id="77" name="Rounded Rectangle 76"/>
+            <p:cNvSpPr/>
+            <p:nvPr/>
+          </p:nvSpPr>
+          <p:spPr>
+            <a:xfrm>
+              <a:off x="5594690" y="2531596"/>
+              <a:ext cx="1274081" cy="913212"/>
+            </a:xfrm>
+            <a:prstGeom prst="roundRect">
+              <a:avLst/>
+            </a:prstGeom>
+            <a:solidFill>
+              <a:schemeClr val="accent4">
+                <a:lumMod val="40000"/>
+                <a:lumOff val="60000"/>
+              </a:schemeClr>
+            </a:solidFill>
+            <a:effectLst>
+              <a:innerShdw blurRad="63500" dist="50800" dir="18900000">
+                <a:prstClr val="black">
+                  <a:alpha val="50000"/>
+                </a:prstClr>
+              </a:innerShdw>
+            </a:effectLst>
+          </p:spPr>
+          <p:style>
+            <a:lnRef idx="2">
+              <a:schemeClr val="dk1"/>
+            </a:lnRef>
+            <a:fillRef idx="1">
+              <a:schemeClr val="lt1"/>
+            </a:fillRef>
+            <a:effectRef idx="0">
+              <a:schemeClr val="dk1"/>
+            </a:effectRef>
+            <a:fontRef idx="minor">
+              <a:schemeClr val="dk1"/>
+            </a:fontRef>
+          </p:style>
+          <p:txBody>
+            <a:bodyPr rtlCol="0" anchor="ctr"/>
+            <a:lstStyle/>
+            <a:p>
+              <a:pPr algn="ctr"/>
+              <a:r>
+                <a:rPr lang="en-GB" sz="1600" b="1" dirty="0"/>
+                <a:t>Transfer Execution Nodes</a:t>
+              </a:r>
+            </a:p>
+          </p:txBody>
+        </p:sp>
+      </p:grpSp>
+      <p:cxnSp>
+        <p:nvCxnSpPr>
+          <p:cNvPr id="83" name="Straight Arrow Connector 82"/>
+          <p:cNvCxnSpPr/>
+          <p:nvPr/>
+        </p:nvCxnSpPr>
+        <p:spPr>
+          <a:xfrm flipV="1">
+            <a:off x="5987084" y="3041621"/>
+            <a:ext cx="504455" cy="1784057"/>
+          </a:xfrm>
+          <a:prstGeom prst="straightConnector1">
+            <a:avLst/>
+          </a:prstGeom>
+          <a:ln w="38100">
+            <a:solidFill>
+              <a:srgbClr val="FF0000"/>
+            </a:solidFill>
+            <a:headEnd type="triangle"/>
+            <a:tailEnd type="triangle"/>
+          </a:ln>
+        </p:spPr>
+        <p:style>
+          <a:lnRef idx="1">
+            <a:schemeClr val="accent1"/>
+          </a:lnRef>
+          <a:fillRef idx="0">
+            <a:schemeClr val="accent1"/>
+          </a:fillRef>
+          <a:effectRef idx="0">
+            <a:schemeClr val="accent1"/>
+          </a:effectRef>
+          <a:fontRef idx="minor">
+            <a:schemeClr val="tx1"/>
+          </a:fontRef>
+        </p:style>
+      </p:cxnSp>
+      <p:cxnSp>
+        <p:nvCxnSpPr>
+          <p:cNvPr id="85" name="Straight Arrow Connector 84"/>
+          <p:cNvCxnSpPr/>
+          <p:nvPr/>
+        </p:nvCxnSpPr>
+        <p:spPr>
+          <a:xfrm flipH="1" flipV="1">
+            <a:off x="6811368" y="3048337"/>
+            <a:ext cx="1400850" cy="1779239"/>
+          </a:xfrm>
+          <a:prstGeom prst="straightConnector1">
+            <a:avLst/>
+          </a:prstGeom>
+          <a:ln w="38100">
+            <a:solidFill>
+              <a:srgbClr val="FF0000"/>
+            </a:solidFill>
+            <a:headEnd type="triangle"/>
+            <a:tailEnd type="triangle"/>
+          </a:ln>
+        </p:spPr>
+        <p:style>
+          <a:lnRef idx="1">
+            <a:schemeClr val="accent1"/>
+          </a:lnRef>
+          <a:fillRef idx="0">
+            <a:schemeClr val="accent1"/>
+          </a:fillRef>
+          <a:effectRef idx="0">
+            <a:schemeClr val="accent1"/>
+          </a:effectRef>
+          <a:fontRef idx="minor">
+            <a:schemeClr val="tx1"/>
+          </a:fontRef>
+        </p:style>
+      </p:cxnSp>
+      <p:cxnSp>
+        <p:nvCxnSpPr>
+          <p:cNvPr id="89" name="Straight Arrow Connector 88"/>
+          <p:cNvCxnSpPr/>
+          <p:nvPr/>
+        </p:nvCxnSpPr>
+        <p:spPr>
+          <a:xfrm flipH="1" flipV="1">
+            <a:off x="7169246" y="3053074"/>
+            <a:ext cx="3519219" cy="1768285"/>
+          </a:xfrm>
+          <a:prstGeom prst="straightConnector1">
+            <a:avLst/>
+          </a:prstGeom>
+          <a:ln w="38100">
+            <a:solidFill>
+              <a:srgbClr val="FF0000"/>
+            </a:solidFill>
+            <a:headEnd type="triangle"/>
+            <a:tailEnd type="triangle"/>
+          </a:ln>
+        </p:spPr>
+        <p:style>
+          <a:lnRef idx="1">
+            <a:schemeClr val="accent1"/>
+          </a:lnRef>
+          <a:fillRef idx="0">
+            <a:schemeClr val="accent1"/>
+          </a:fillRef>
+          <a:effectRef idx="0">
+            <a:schemeClr val="accent1"/>
+          </a:effectRef>
+          <a:fontRef idx="minor">
+            <a:schemeClr val="tx1"/>
+          </a:fontRef>
+        </p:style>
+      </p:cxnSp>
+      <p:cxnSp>
+        <p:nvCxnSpPr>
+          <p:cNvPr id="91" name="Straight Arrow Connector 90"/>
+          <p:cNvCxnSpPr/>
+          <p:nvPr/>
+        </p:nvCxnSpPr>
+        <p:spPr>
+          <a:xfrm>
+            <a:off x="9405752" y="3169768"/>
+            <a:ext cx="0" cy="2567493"/>
+          </a:xfrm>
+          <a:prstGeom prst="straightConnector1">
+            <a:avLst/>
+          </a:prstGeom>
+          <a:ln w="38100">
+            <a:solidFill>
+              <a:srgbClr val="00B0F0"/>
+            </a:solidFill>
+            <a:tailEnd type="triangle"/>
+          </a:ln>
+        </p:spPr>
+        <p:style>
+          <a:lnRef idx="1">
+            <a:schemeClr val="accent1"/>
+          </a:lnRef>
+          <a:fillRef idx="0">
+            <a:schemeClr val="accent1"/>
+          </a:fillRef>
+          <a:effectRef idx="0">
+            <a:schemeClr val="accent1"/>
+          </a:effectRef>
+          <a:fontRef idx="minor">
+            <a:schemeClr val="tx1"/>
+          </a:fontRef>
+        </p:style>
+      </p:cxnSp>
+      <p:cxnSp>
+        <p:nvCxnSpPr>
+          <p:cNvPr id="97" name="Elbow Connector 96"/>
+          <p:cNvCxnSpPr/>
+          <p:nvPr/>
+        </p:nvCxnSpPr>
+        <p:spPr>
+          <a:xfrm rot="5400000">
+            <a:off x="6764106" y="3487443"/>
+            <a:ext cx="2567492" cy="1932144"/>
+          </a:xfrm>
+          <a:prstGeom prst="bentConnector3">
+            <a:avLst>
+              <a:gd name="adj1" fmla="val 50000"/>
+            </a:avLst>
+          </a:prstGeom>
+          <a:ln w="38100">
+            <a:solidFill>
+              <a:srgbClr val="00B0F0"/>
+            </a:solidFill>
+            <a:tailEnd type="triangle"/>
+          </a:ln>
+        </p:spPr>
+        <p:style>
+          <a:lnRef idx="1">
+            <a:schemeClr val="accent1"/>
+          </a:lnRef>
+          <a:fillRef idx="0">
+            <a:schemeClr val="accent1"/>
+          </a:fillRef>
+          <a:effectRef idx="0">
+            <a:schemeClr val="accent1"/>
+          </a:effectRef>
+          <a:fontRef idx="minor">
+            <a:schemeClr val="tx1"/>
+          </a:fontRef>
+        </p:style>
+      </p:cxnSp>
+      <p:cxnSp>
+        <p:nvCxnSpPr>
+          <p:cNvPr id="109" name="Straight Connector 108"/>
+          <p:cNvCxnSpPr>
+            <a:stCxn id="46" idx="3"/>
+            <a:endCxn id="54" idx="1"/>
+          </p:cNvCxnSpPr>
+          <p:nvPr/>
+        </p:nvCxnSpPr>
+        <p:spPr>
+          <a:xfrm flipV="1">
+            <a:off x="6438475" y="5741432"/>
+            <a:ext cx="1007341" cy="20800"/>
+          </a:xfrm>
+          <a:prstGeom prst="line">
+            <a:avLst/>
+          </a:prstGeom>
+          <a:ln w="31750">
+            <a:solidFill>
+              <a:srgbClr val="00B050"/>
+            </a:solidFill>
+            <a:prstDash val="sysDash"/>
+            <a:headEnd type="triangle"/>
+            <a:tailEnd type="triangle"/>
+          </a:ln>
+        </p:spPr>
+        <p:style>
+          <a:lnRef idx="1">
+            <a:schemeClr val="accent1"/>
+          </a:lnRef>
+          <a:fillRef idx="0">
+            <a:schemeClr val="accent1"/>
+          </a:fillRef>
+          <a:effectRef idx="0">
+            <a:schemeClr val="accent1"/>
+          </a:effectRef>
+          <a:fontRef idx="minor">
+            <a:schemeClr val="tx1"/>
+          </a:fontRef>
+        </p:style>
+      </p:cxnSp>
+      <p:cxnSp>
+        <p:nvCxnSpPr>
+          <p:cNvPr id="115" name="Straight Connector 114"/>
+          <p:cNvCxnSpPr>
+            <a:endCxn id="63" idx="1"/>
+          </p:cNvCxnSpPr>
+          <p:nvPr/>
+        </p:nvCxnSpPr>
+        <p:spPr>
+          <a:xfrm>
+            <a:off x="8745456" y="5737261"/>
+            <a:ext cx="1072962" cy="4171"/>
+          </a:xfrm>
+          <a:prstGeom prst="line">
+            <a:avLst/>
+          </a:prstGeom>
+          <a:ln w="31750">
+            <a:solidFill>
+              <a:srgbClr val="00B050"/>
+            </a:solidFill>
+            <a:prstDash val="sysDash"/>
+            <a:headEnd type="triangle"/>
+            <a:tailEnd type="triangle"/>
+          </a:ln>
+        </p:spPr>
+        <p:style>
+          <a:lnRef idx="1">
+            <a:schemeClr val="accent1"/>
+          </a:lnRef>
+          <a:fillRef idx="0">
+            <a:schemeClr val="accent1"/>
+          </a:fillRef>
+          <a:effectRef idx="0">
+            <a:schemeClr val="accent1"/>
+          </a:effectRef>
+          <a:fontRef idx="minor">
+            <a:schemeClr val="tx1"/>
+          </a:fontRef>
+        </p:style>
+      </p:cxnSp>
+      <p:cxnSp>
+        <p:nvCxnSpPr>
+          <p:cNvPr id="124" name="Straight Connector 123"/>
+          <p:cNvCxnSpPr/>
+          <p:nvPr/>
+        </p:nvCxnSpPr>
+        <p:spPr>
+          <a:xfrm>
+            <a:off x="4995384" y="6710675"/>
+            <a:ext cx="6460211" cy="4171"/>
+          </a:xfrm>
+          <a:prstGeom prst="line">
+            <a:avLst/>
+          </a:prstGeom>
+          <a:ln w="31750">
+            <a:solidFill>
+              <a:srgbClr val="00B050"/>
+            </a:solidFill>
+            <a:prstDash val="sysDash"/>
+            <a:headEnd type="triangle"/>
+            <a:tailEnd type="triangle"/>
+          </a:ln>
+        </p:spPr>
+        <p:style>
+          <a:lnRef idx="1">
+            <a:schemeClr val="accent1"/>
+          </a:lnRef>
+          <a:fillRef idx="0">
+            <a:schemeClr val="accent1"/>
+          </a:fillRef>
+          <a:effectRef idx="0">
+            <a:schemeClr val="accent1"/>
+          </a:effectRef>
+          <a:fontRef idx="minor">
+            <a:schemeClr val="tx1"/>
+          </a:fontRef>
+        </p:style>
+      </p:cxnSp>
+      <p:cxnSp>
+        <p:nvCxnSpPr>
+          <p:cNvPr id="126" name="Straight Connector 125"/>
+          <p:cNvCxnSpPr/>
+          <p:nvPr/>
+        </p:nvCxnSpPr>
+        <p:spPr>
+          <a:xfrm>
+            <a:off x="4995384" y="5737261"/>
+            <a:ext cx="0" cy="973414"/>
+          </a:xfrm>
+          <a:prstGeom prst="line">
+            <a:avLst/>
+          </a:prstGeom>
+          <a:ln w="31750">
+            <a:solidFill>
+              <a:srgbClr val="00B050"/>
+            </a:solidFill>
+            <a:prstDash val="sysDash"/>
+            <a:headEnd type="none"/>
+            <a:tailEnd type="none"/>
+          </a:ln>
+        </p:spPr>
+        <p:style>
+          <a:lnRef idx="1">
+            <a:schemeClr val="accent1"/>
+          </a:lnRef>
+          <a:fillRef idx="0">
+            <a:schemeClr val="accent1"/>
+          </a:fillRef>
+          <a:effectRef idx="0">
+            <a:schemeClr val="accent1"/>
+          </a:effectRef>
+          <a:fontRef idx="minor">
+            <a:schemeClr val="tx1"/>
+          </a:fontRef>
+        </p:style>
+      </p:cxnSp>
+      <p:cxnSp>
+        <p:nvCxnSpPr>
+          <p:cNvPr id="131" name="Straight Connector 130"/>
+          <p:cNvCxnSpPr/>
+          <p:nvPr/>
+        </p:nvCxnSpPr>
+        <p:spPr>
+          <a:xfrm>
+            <a:off x="11455595" y="5733155"/>
+            <a:ext cx="0" cy="973414"/>
+          </a:xfrm>
+          <a:prstGeom prst="line">
+            <a:avLst/>
+          </a:prstGeom>
+          <a:ln w="31750">
+            <a:solidFill>
+              <a:srgbClr val="00B050"/>
+            </a:solidFill>
+            <a:prstDash val="sysDash"/>
+            <a:headEnd type="none"/>
+            <a:tailEnd type="none"/>
+          </a:ln>
+        </p:spPr>
+        <p:style>
+          <a:lnRef idx="1">
+            <a:schemeClr val="accent1"/>
+          </a:lnRef>
+          <a:fillRef idx="0">
+            <a:schemeClr val="accent1"/>
+          </a:fillRef>
+          <a:effectRef idx="0">
+            <a:schemeClr val="accent1"/>
+          </a:effectRef>
+          <a:fontRef idx="minor">
+            <a:schemeClr val="tx1"/>
+          </a:fontRef>
+        </p:style>
+      </p:cxnSp>
+      <p:cxnSp>
+        <p:nvCxnSpPr>
+          <p:cNvPr id="133" name="Straight Connector 132"/>
+          <p:cNvCxnSpPr>
+            <a:endCxn id="46" idx="1"/>
+          </p:cNvCxnSpPr>
+          <p:nvPr/>
+        </p:nvCxnSpPr>
+        <p:spPr>
+          <a:xfrm flipV="1">
+            <a:off x="5001160" y="5762232"/>
+            <a:ext cx="137675" cy="306"/>
+          </a:xfrm>
+          <a:prstGeom prst="line">
+            <a:avLst/>
+          </a:prstGeom>
+          <a:ln w="31750">
+            <a:solidFill>
+              <a:srgbClr val="00B050"/>
+            </a:solidFill>
+            <a:prstDash val="sysDash"/>
+            <a:headEnd type="none"/>
+            <a:tailEnd type="none"/>
+          </a:ln>
+        </p:spPr>
+        <p:style>
+          <a:lnRef idx="1">
+            <a:schemeClr val="accent1"/>
+          </a:lnRef>
+          <a:fillRef idx="0">
+            <a:schemeClr val="accent1"/>
+          </a:fillRef>
+          <a:effectRef idx="0">
+            <a:schemeClr val="accent1"/>
+          </a:effectRef>
+          <a:fontRef idx="minor">
+            <a:schemeClr val="tx1"/>
+          </a:fontRef>
+        </p:style>
+      </p:cxnSp>
+      <p:cxnSp>
+        <p:nvCxnSpPr>
+          <p:cNvPr id="136" name="Straight Connector 135"/>
+          <p:cNvCxnSpPr/>
+          <p:nvPr/>
+        </p:nvCxnSpPr>
+        <p:spPr>
+          <a:xfrm>
+            <a:off x="11118058" y="5732486"/>
+            <a:ext cx="337537" cy="669"/>
+          </a:xfrm>
+          <a:prstGeom prst="line">
+            <a:avLst/>
+          </a:prstGeom>
+          <a:ln w="31750">
+            <a:solidFill>
+              <a:srgbClr val="00B050"/>
+            </a:solidFill>
+            <a:prstDash val="sysDash"/>
+            <a:headEnd type="none"/>
+            <a:tailEnd type="none"/>
+          </a:ln>
+        </p:spPr>
+        <p:style>
+          <a:lnRef idx="1">
+            <a:schemeClr val="accent1"/>
+          </a:lnRef>
+          <a:fillRef idx="0">
+            <a:schemeClr val="accent1"/>
+          </a:fillRef>
+          <a:effectRef idx="0">
+            <a:schemeClr val="accent1"/>
+          </a:effectRef>
+          <a:fontRef idx="minor">
+            <a:schemeClr val="tx1"/>
+          </a:fontRef>
+        </p:style>
+      </p:cxnSp>
+      <p:cxnSp>
+        <p:nvCxnSpPr>
+          <p:cNvPr id="138" name="Straight Arrow Connector 137"/>
+          <p:cNvCxnSpPr/>
+          <p:nvPr/>
+        </p:nvCxnSpPr>
+        <p:spPr>
+          <a:xfrm flipH="1" flipV="1">
+            <a:off x="5797161" y="6486682"/>
+            <a:ext cx="5764866" cy="10850"/>
+          </a:xfrm>
+          <a:prstGeom prst="straightConnector1">
+            <a:avLst/>
+          </a:prstGeom>
+          <a:ln w="19050">
+            <a:solidFill>
+              <a:srgbClr val="FF0000"/>
+            </a:solidFill>
+            <a:prstDash val="sysDot"/>
+            <a:tailEnd type="none"/>
+          </a:ln>
+        </p:spPr>
+        <p:style>
+          <a:lnRef idx="1">
+            <a:schemeClr val="accent1"/>
+          </a:lnRef>
+          <a:fillRef idx="0">
+            <a:schemeClr val="accent1"/>
+          </a:fillRef>
+          <a:effectRef idx="0">
+            <a:schemeClr val="accent1"/>
+          </a:effectRef>
+          <a:fontRef idx="minor">
+            <a:schemeClr val="tx1"/>
+          </a:fontRef>
+        </p:style>
+      </p:cxnSp>
+      <p:grpSp>
+        <p:nvGrpSpPr>
+          <p:cNvPr id="139" name="Group 138"/>
+          <p:cNvGrpSpPr/>
+          <p:nvPr/>
+        </p:nvGrpSpPr>
+        <p:grpSpPr>
+          <a:xfrm>
+            <a:off x="10762649" y="2676368"/>
+            <a:ext cx="1329239" cy="827232"/>
+            <a:chOff x="3934841" y="1133856"/>
+            <a:chExt cx="1353771" cy="827232"/>
+          </a:xfrm>
+        </p:grpSpPr>
+        <p:sp>
+          <p:nvSpPr>
+            <p:cNvPr id="140" name="Rounded Rectangle 139"/>
+            <p:cNvSpPr/>
+            <p:nvPr/>
+          </p:nvSpPr>
+          <p:spPr>
+            <a:xfrm>
+              <a:off x="4098845" y="1133856"/>
+              <a:ext cx="1189767" cy="684800"/>
+            </a:xfrm>
+            <a:prstGeom prst="roundRect">
+              <a:avLst/>
+            </a:prstGeom>
+            <a:solidFill>
+              <a:schemeClr val="accent6">
+                <a:lumMod val="40000"/>
+                <a:lumOff val="60000"/>
+              </a:schemeClr>
+            </a:solidFill>
+            <a:effectLst>
+              <a:innerShdw blurRad="63500" dist="50800" dir="18900000">
+                <a:prstClr val="black">
+                  <a:alpha val="50000"/>
+                </a:prstClr>
+              </a:innerShdw>
+            </a:effectLst>
+          </p:spPr>
+          <p:style>
+            <a:lnRef idx="2">
+              <a:schemeClr val="dk1"/>
+            </a:lnRef>
+            <a:fillRef idx="1">
+              <a:schemeClr val="lt1"/>
+            </a:fillRef>
+            <a:effectRef idx="0">
+              <a:schemeClr val="dk1"/>
+            </a:effectRef>
+            <a:fontRef idx="minor">
+              <a:schemeClr val="dk1"/>
+            </a:fontRef>
+          </p:style>
+          <p:txBody>
+            <a:bodyPr rtlCol="0" anchor="ctr"/>
+            <a:lstStyle/>
+            <a:p>
+              <a:pPr algn="ctr"/>
+              <a:endParaRPr lang="en-GB" dirty="0"/>
+            </a:p>
+          </p:txBody>
+        </p:sp>
+        <p:sp>
+          <p:nvSpPr>
+            <p:cNvPr id="141" name="Rounded Rectangle 140"/>
+            <p:cNvSpPr/>
+            <p:nvPr/>
+          </p:nvSpPr>
+          <p:spPr>
+            <a:xfrm>
+              <a:off x="4035559" y="1211106"/>
+              <a:ext cx="1189767" cy="684800"/>
+            </a:xfrm>
+            <a:prstGeom prst="roundRect">
+              <a:avLst/>
+            </a:prstGeom>
+            <a:solidFill>
+              <a:schemeClr val="accent6">
+                <a:lumMod val="40000"/>
+                <a:lumOff val="60000"/>
+              </a:schemeClr>
+            </a:solidFill>
+            <a:effectLst>
+              <a:innerShdw blurRad="63500" dist="50800" dir="18900000">
+                <a:prstClr val="black">
+                  <a:alpha val="50000"/>
+                </a:prstClr>
+              </a:innerShdw>
+            </a:effectLst>
+          </p:spPr>
+          <p:style>
+            <a:lnRef idx="2">
+              <a:schemeClr val="dk1"/>
+            </a:lnRef>
+            <a:fillRef idx="1">
+              <a:schemeClr val="lt1"/>
+            </a:fillRef>
+            <a:effectRef idx="0">
+              <a:schemeClr val="dk1"/>
+            </a:effectRef>
+            <a:fontRef idx="minor">
+              <a:schemeClr val="dk1"/>
+            </a:fontRef>
+          </p:style>
+          <p:txBody>
+            <a:bodyPr rtlCol="0" anchor="ctr"/>
+            <a:lstStyle/>
+            <a:p>
+              <a:pPr algn="ctr"/>
+              <a:endParaRPr lang="en-GB" dirty="0"/>
+            </a:p>
+          </p:txBody>
+        </p:sp>
+        <p:sp>
+          <p:nvSpPr>
+            <p:cNvPr id="142" name="Rounded Rectangle 141"/>
+            <p:cNvSpPr/>
+            <p:nvPr/>
+          </p:nvSpPr>
+          <p:spPr>
+            <a:xfrm>
+              <a:off x="3934841" y="1276288"/>
+              <a:ext cx="1229519" cy="684800"/>
+            </a:xfrm>
+            <a:prstGeom prst="roundRect">
+              <a:avLst/>
+            </a:prstGeom>
+            <a:solidFill>
+              <a:schemeClr val="accent6">
+                <a:lumMod val="40000"/>
+                <a:lumOff val="60000"/>
+              </a:schemeClr>
+            </a:solidFill>
+            <a:effectLst>
+              <a:innerShdw blurRad="63500" dist="50800" dir="18900000">
+                <a:prstClr val="black">
+                  <a:alpha val="50000"/>
+                </a:prstClr>
+              </a:innerShdw>
+            </a:effectLst>
+          </p:spPr>
+          <p:style>
+            <a:lnRef idx="2">
+              <a:schemeClr val="dk1"/>
+            </a:lnRef>
+            <a:fillRef idx="1">
+              <a:schemeClr val="lt1"/>
+            </a:fillRef>
+            <a:effectRef idx="0">
+              <a:schemeClr val="dk1"/>
+            </a:effectRef>
+            <a:fontRef idx="minor">
+              <a:schemeClr val="dk1"/>
+            </a:fontRef>
+          </p:style>
+          <p:txBody>
+            <a:bodyPr rtlCol="0" anchor="ctr"/>
+            <a:lstStyle/>
+            <a:p>
+              <a:pPr algn="ctr"/>
+              <a:r>
+                <a:rPr lang="en-GB" sz="1600" b="1" dirty="0" err="1" smtClean="0"/>
+                <a:t>Kibana</a:t>
+              </a:r>
+              <a:endParaRPr lang="en-GB" sz="1600" b="1" dirty="0" smtClean="0"/>
+            </a:p>
+            <a:p>
+              <a:pPr algn="ctr"/>
+              <a:r>
+                <a:rPr lang="en-GB" sz="1600" b="1" dirty="0" smtClean="0"/>
+                <a:t>Monitoring</a:t>
+              </a:r>
+              <a:endParaRPr lang="en-GB" sz="1600" b="1" dirty="0"/>
+            </a:p>
+          </p:txBody>
+        </p:sp>
+      </p:grpSp>
+      <p:sp>
+        <p:nvSpPr>
+          <p:cNvPr id="143" name="Rounded Rectangle 142"/>
+          <p:cNvSpPr/>
+          <p:nvPr/>
+        </p:nvSpPr>
+        <p:spPr>
+          <a:xfrm>
+            <a:off x="10985874" y="3919269"/>
+            <a:ext cx="1107860" cy="462761"/>
+          </a:xfrm>
+          <a:prstGeom prst="roundRect">
+            <a:avLst/>
+          </a:prstGeom>
+          <a:solidFill>
+            <a:schemeClr val="accent6">
+              <a:lumMod val="40000"/>
+              <a:lumOff val="60000"/>
+            </a:schemeClr>
+          </a:solidFill>
+          <a:effectLst>
+            <a:innerShdw blurRad="63500" dist="50800" dir="18900000">
+              <a:prstClr val="black">
+                <a:alpha val="50000"/>
+              </a:prstClr>
+            </a:innerShdw>
+          </a:effectLst>
+        </p:spPr>
+        <p:style>
+          <a:lnRef idx="2">
+            <a:schemeClr val="dk1"/>
+          </a:lnRef>
+          <a:fillRef idx="1">
+            <a:schemeClr val="lt1"/>
+          </a:fillRef>
+          <a:effectRef idx="0">
+            <a:schemeClr val="dk1"/>
+          </a:effectRef>
+          <a:fontRef idx="minor">
+            <a:schemeClr val="dk1"/>
+          </a:fontRef>
+        </p:style>
+        <p:txBody>
+          <a:bodyPr rtlCol="0" anchor="ctr"/>
+          <a:lstStyle/>
+          <a:p>
+            <a:pPr algn="ctr"/>
+            <a:r>
+              <a:rPr lang="en-GB" sz="1600" b="1" dirty="0" smtClean="0"/>
+              <a:t>Mon</a:t>
+            </a:r>
+            <a:r>
+              <a:rPr lang="en-US" altLang="zh-CN" sz="1600" b="1" dirty="0" smtClean="0"/>
+              <a:t>ALISA</a:t>
+            </a:r>
+            <a:endParaRPr lang="en-GB" sz="1600" b="1" dirty="0"/>
+          </a:p>
+        </p:txBody>
+      </p:sp>
+      <p:cxnSp>
+        <p:nvCxnSpPr>
+          <p:cNvPr id="148" name="Straight Arrow Connector 147"/>
+          <p:cNvCxnSpPr/>
+          <p:nvPr/>
+        </p:nvCxnSpPr>
+        <p:spPr>
+          <a:xfrm flipH="1" flipV="1">
+            <a:off x="11547688" y="4382030"/>
+            <a:ext cx="5949" cy="2086833"/>
+          </a:xfrm>
+          <a:prstGeom prst="straightConnector1">
+            <a:avLst/>
+          </a:prstGeom>
+          <a:ln w="19050">
+            <a:solidFill>
+              <a:srgbClr val="FF0000"/>
+            </a:solidFill>
+            <a:prstDash val="sysDot"/>
+            <a:tailEnd type="none"/>
+          </a:ln>
+        </p:spPr>
+        <p:style>
+          <a:lnRef idx="1">
+            <a:schemeClr val="accent1"/>
+          </a:lnRef>
+          <a:fillRef idx="0">
+            <a:schemeClr val="accent1"/>
+          </a:fillRef>
+          <a:effectRef idx="0">
+            <a:schemeClr val="accent1"/>
+          </a:effectRef>
+          <a:fontRef idx="minor">
+            <a:schemeClr val="tx1"/>
+          </a:fontRef>
+        </p:style>
+      </p:cxnSp>
+      <p:cxnSp>
+        <p:nvCxnSpPr>
+          <p:cNvPr id="151" name="Straight Arrow Connector 150"/>
+          <p:cNvCxnSpPr/>
+          <p:nvPr/>
+        </p:nvCxnSpPr>
+        <p:spPr>
+          <a:xfrm flipV="1">
+            <a:off x="10474933" y="6192372"/>
+            <a:ext cx="6440" cy="305160"/>
+          </a:xfrm>
+          <a:prstGeom prst="straightConnector1">
+            <a:avLst/>
+          </a:prstGeom>
+          <a:ln w="19050">
+            <a:solidFill>
+              <a:srgbClr val="FF0000"/>
+            </a:solidFill>
+            <a:prstDash val="sysDot"/>
+            <a:tailEnd type="none"/>
+          </a:ln>
+        </p:spPr>
+        <p:style>
+          <a:lnRef idx="1">
+            <a:schemeClr val="accent1"/>
+          </a:lnRef>
+          <a:fillRef idx="0">
+            <a:schemeClr val="accent1"/>
+          </a:fillRef>
+          <a:effectRef idx="0">
+            <a:schemeClr val="accent1"/>
+          </a:effectRef>
+          <a:fontRef idx="minor">
+            <a:schemeClr val="tx1"/>
+          </a:fontRef>
+        </p:style>
+      </p:cxnSp>
+      <p:cxnSp>
+        <p:nvCxnSpPr>
+          <p:cNvPr id="155" name="Straight Arrow Connector 154"/>
+          <p:cNvCxnSpPr/>
+          <p:nvPr/>
+        </p:nvCxnSpPr>
+        <p:spPr>
+          <a:xfrm flipH="1" flipV="1">
+            <a:off x="8083673" y="6166410"/>
+            <a:ext cx="3919" cy="331122"/>
+          </a:xfrm>
+          <a:prstGeom prst="straightConnector1">
+            <a:avLst/>
+          </a:prstGeom>
+          <a:ln w="19050">
+            <a:solidFill>
+              <a:srgbClr val="FF0000"/>
+            </a:solidFill>
+            <a:prstDash val="sysDot"/>
+            <a:tailEnd type="none"/>
+          </a:ln>
+        </p:spPr>
+        <p:style>
+          <a:lnRef idx="1">
+            <a:schemeClr val="accent1"/>
+          </a:lnRef>
+          <a:fillRef idx="0">
+            <a:schemeClr val="accent1"/>
+          </a:fillRef>
+          <a:effectRef idx="0">
+            <a:schemeClr val="accent1"/>
+          </a:effectRef>
+          <a:fontRef idx="minor">
+            <a:schemeClr val="tx1"/>
+          </a:fontRef>
+        </p:style>
+      </p:cxnSp>
+      <p:cxnSp>
+        <p:nvCxnSpPr>
+          <p:cNvPr id="159" name="Straight Arrow Connector 158"/>
+          <p:cNvCxnSpPr/>
+          <p:nvPr/>
+        </p:nvCxnSpPr>
+        <p:spPr>
+          <a:xfrm flipV="1">
+            <a:off x="5823846" y="6192371"/>
+            <a:ext cx="6440" cy="291796"/>
+          </a:xfrm>
+          <a:prstGeom prst="straightConnector1">
+            <a:avLst/>
+          </a:prstGeom>
+          <a:ln w="19050">
+            <a:solidFill>
+              <a:srgbClr val="FF0000"/>
+            </a:solidFill>
+            <a:prstDash val="sysDot"/>
+            <a:tailEnd type="none"/>
+          </a:ln>
+        </p:spPr>
+        <p:style>
+          <a:lnRef idx="1">
+            <a:schemeClr val="accent1"/>
+          </a:lnRef>
+          <a:fillRef idx="0">
+            <a:schemeClr val="accent1"/>
+          </a:fillRef>
+          <a:effectRef idx="0">
+            <a:schemeClr val="accent1"/>
+          </a:effectRef>
+          <a:fontRef idx="minor">
+            <a:schemeClr val="tx1"/>
+          </a:fontRef>
+        </p:style>
+      </p:cxnSp>
+      <p:cxnSp>
+        <p:nvCxnSpPr>
+          <p:cNvPr id="161" name="Straight Arrow Connector 160"/>
+          <p:cNvCxnSpPr>
+            <a:endCxn id="71" idx="0"/>
+          </p:cNvCxnSpPr>
+          <p:nvPr/>
+        </p:nvCxnSpPr>
+        <p:spPr>
+          <a:xfrm flipH="1">
+            <a:off x="6984266" y="1964625"/>
+            <a:ext cx="788098" cy="455621"/>
+          </a:xfrm>
+          <a:prstGeom prst="straightConnector1">
+            <a:avLst/>
+          </a:prstGeom>
+          <a:ln w="38100">
+            <a:solidFill>
+              <a:schemeClr val="tx1"/>
+            </a:solidFill>
+            <a:headEnd type="triangle"/>
+            <a:tailEnd type="triangle"/>
+          </a:ln>
+        </p:spPr>
+        <p:style>
+          <a:lnRef idx="1">
+            <a:schemeClr val="accent1"/>
+          </a:lnRef>
+          <a:fillRef idx="0">
+            <a:schemeClr val="accent1"/>
+          </a:fillRef>
+          <a:effectRef idx="0">
+            <a:schemeClr val="accent1"/>
+          </a:effectRef>
+          <a:fontRef idx="minor">
+            <a:schemeClr val="tx1"/>
+          </a:fontRef>
+        </p:style>
+      </p:cxnSp>
+      <p:cxnSp>
+        <p:nvCxnSpPr>
+          <p:cNvPr id="163" name="Straight Arrow Connector 162"/>
+          <p:cNvCxnSpPr>
+            <a:stCxn id="77" idx="1"/>
+          </p:cNvCxnSpPr>
+          <p:nvPr/>
+        </p:nvCxnSpPr>
+        <p:spPr>
+          <a:xfrm flipH="1" flipV="1">
+            <a:off x="8359512" y="1970896"/>
+            <a:ext cx="268177" cy="811268"/>
+          </a:xfrm>
+          <a:prstGeom prst="straightConnector1">
+            <a:avLst/>
+          </a:prstGeom>
+          <a:ln w="38100">
+            <a:solidFill>
+              <a:schemeClr val="tx1"/>
+            </a:solidFill>
+            <a:headEnd type="triangle"/>
+            <a:tailEnd type="triangle"/>
+          </a:ln>
+        </p:spPr>
+        <p:style>
+          <a:lnRef idx="1">
+            <a:schemeClr val="accent1"/>
+          </a:lnRef>
+          <a:fillRef idx="0">
+            <a:schemeClr val="accent1"/>
+          </a:fillRef>
+          <a:effectRef idx="0">
+            <a:schemeClr val="accent1"/>
+          </a:effectRef>
+          <a:fontRef idx="minor">
+            <a:schemeClr val="tx1"/>
+          </a:fontRef>
+        </p:style>
+      </p:cxnSp>
+      <p:cxnSp>
+        <p:nvCxnSpPr>
+          <p:cNvPr id="166" name="Straight Arrow Connector 165"/>
+          <p:cNvCxnSpPr/>
+          <p:nvPr/>
+        </p:nvCxnSpPr>
+        <p:spPr>
+          <a:xfrm flipH="1" flipV="1">
+            <a:off x="8773623" y="1599582"/>
+            <a:ext cx="1211576" cy="7814"/>
+          </a:xfrm>
+          <a:prstGeom prst="straightConnector1">
+            <a:avLst/>
+          </a:prstGeom>
+          <a:ln w="38100">
+            <a:solidFill>
+              <a:schemeClr val="tx1"/>
+            </a:solidFill>
+            <a:headEnd type="triangle"/>
+            <a:tailEnd type="triangle"/>
+          </a:ln>
+        </p:spPr>
+        <p:style>
+          <a:lnRef idx="1">
+            <a:schemeClr val="accent1"/>
+          </a:lnRef>
+          <a:fillRef idx="0">
+            <a:schemeClr val="accent1"/>
+          </a:fillRef>
+          <a:effectRef idx="0">
+            <a:schemeClr val="accent1"/>
+          </a:effectRef>
+          <a:fontRef idx="minor">
+            <a:schemeClr val="tx1"/>
+          </a:fontRef>
+        </p:style>
+      </p:cxnSp>
+      <p:cxnSp>
+        <p:nvCxnSpPr>
+          <p:cNvPr id="167" name="Straight Arrow Connector 166"/>
+          <p:cNvCxnSpPr>
+            <a:endCxn id="140" idx="0"/>
+          </p:cNvCxnSpPr>
+          <p:nvPr/>
+        </p:nvCxnSpPr>
+        <p:spPr>
+          <a:xfrm>
+            <a:off x="10449712" y="1939504"/>
+            <a:ext cx="1058073" cy="736864"/>
+          </a:xfrm>
+          <a:prstGeom prst="straightConnector1">
+            <a:avLst/>
+          </a:prstGeom>
+          <a:ln w="28575">
+            <a:solidFill>
+              <a:schemeClr val="tx1"/>
+            </a:solidFill>
+            <a:headEnd type="triangle"/>
+            <a:tailEnd type="triangle"/>
+          </a:ln>
+        </p:spPr>
+        <p:style>
+          <a:lnRef idx="1">
+            <a:schemeClr val="accent1"/>
+          </a:lnRef>
+          <a:fillRef idx="0">
+            <a:schemeClr val="accent1"/>
+          </a:fillRef>
+          <a:effectRef idx="0">
+            <a:schemeClr val="accent1"/>
+          </a:effectRef>
+          <a:fontRef idx="minor">
+            <a:schemeClr val="tx1"/>
+          </a:fontRef>
+        </p:style>
+      </p:cxnSp>
+      <p:cxnSp>
+        <p:nvCxnSpPr>
+          <p:cNvPr id="169" name="Straight Arrow Connector 168"/>
+          <p:cNvCxnSpPr>
+            <a:endCxn id="143" idx="0"/>
+          </p:cNvCxnSpPr>
+          <p:nvPr/>
+        </p:nvCxnSpPr>
+        <p:spPr>
+          <a:xfrm>
+            <a:off x="11480461" y="3506115"/>
+            <a:ext cx="59343" cy="413154"/>
+          </a:xfrm>
+          <a:prstGeom prst="straightConnector1">
+            <a:avLst/>
+          </a:prstGeom>
+          <a:ln w="28575">
+            <a:solidFill>
+              <a:schemeClr val="tx1"/>
+            </a:solidFill>
+            <a:headEnd type="triangle"/>
+            <a:tailEnd type="triangle"/>
+          </a:ln>
+        </p:spPr>
+        <p:style>
+          <a:lnRef idx="1">
+            <a:schemeClr val="accent1"/>
+          </a:lnRef>
+          <a:fillRef idx="0">
+            <a:schemeClr val="accent1"/>
+          </a:fillRef>
+          <a:effectRef idx="0">
+            <a:schemeClr val="accent1"/>
+          </a:effectRef>
+          <a:fontRef idx="minor">
+            <a:schemeClr val="tx1"/>
+          </a:fontRef>
+        </p:style>
+      </p:cxnSp>
+      <p:sp>
+        <p:nvSpPr>
+          <p:cNvPr id="178" name="Rounded Rectangle 177"/>
+          <p:cNvSpPr/>
+          <p:nvPr/>
+        </p:nvSpPr>
+        <p:spPr>
+          <a:xfrm>
+            <a:off x="5316536" y="4843497"/>
+            <a:ext cx="1222970" cy="526553"/>
+          </a:xfrm>
+          <a:prstGeom prst="roundRect">
+            <a:avLst/>
+          </a:prstGeom>
+          <a:solidFill>
+            <a:schemeClr val="accent4">
+              <a:lumMod val="40000"/>
+              <a:lumOff val="60000"/>
+            </a:schemeClr>
+          </a:solidFill>
+          <a:effectLst>
+            <a:innerShdw blurRad="63500" dist="50800" dir="18900000">
+              <a:prstClr val="black">
+                <a:alpha val="50000"/>
+              </a:prstClr>
+            </a:innerShdw>
+          </a:effectLst>
+        </p:spPr>
+        <p:style>
+          <a:lnRef idx="2">
+            <a:schemeClr val="dk1"/>
+          </a:lnRef>
+          <a:fillRef idx="1">
+            <a:schemeClr val="lt1"/>
+          </a:fillRef>
+          <a:effectRef idx="0">
+            <a:schemeClr val="dk1"/>
+          </a:effectRef>
+          <a:fontRef idx="minor">
+            <a:schemeClr val="dk1"/>
+          </a:fontRef>
+        </p:style>
+        <p:txBody>
+          <a:bodyPr rtlCol="0" anchor="ctr"/>
+          <a:lstStyle/>
+          <a:p>
+            <a:pPr algn="ctr"/>
+            <a:r>
+              <a:rPr lang="en-US" altLang="zh-CN" sz="1600" b="1" dirty="0" smtClean="0"/>
+              <a:t>ALTO</a:t>
+            </a:r>
+            <a:r>
+              <a:rPr lang="zh-CN" altLang="en-US" sz="1600" b="1" dirty="0" smtClean="0"/>
+              <a:t> </a:t>
+            </a:r>
+            <a:r>
+              <a:rPr lang="en-US" altLang="zh-CN" sz="1600" b="1" dirty="0" smtClean="0"/>
+              <a:t>Controller</a:t>
+            </a:r>
+            <a:endParaRPr lang="en-GB" sz="1600" b="1" dirty="0"/>
+          </a:p>
+        </p:txBody>
+      </p:sp>
+      <p:sp>
+        <p:nvSpPr>
+          <p:cNvPr id="179" name="Rounded Rectangle 178"/>
+          <p:cNvSpPr/>
+          <p:nvPr/>
+        </p:nvSpPr>
+        <p:spPr>
+          <a:xfrm>
+            <a:off x="7575686" y="4839793"/>
+            <a:ext cx="1222970" cy="526553"/>
+          </a:xfrm>
+          <a:prstGeom prst="roundRect">
+            <a:avLst/>
+          </a:prstGeom>
+          <a:solidFill>
+            <a:schemeClr val="accent4">
+              <a:lumMod val="40000"/>
+              <a:lumOff val="60000"/>
+            </a:schemeClr>
+          </a:solidFill>
+          <a:effectLst>
+            <a:innerShdw blurRad="63500" dist="50800" dir="18900000">
+              <a:prstClr val="black">
+                <a:alpha val="50000"/>
+              </a:prstClr>
+            </a:innerShdw>
+          </a:effectLst>
+        </p:spPr>
+        <p:style>
+          <a:lnRef idx="2">
+            <a:schemeClr val="dk1"/>
+          </a:lnRef>
+          <a:fillRef idx="1">
+            <a:schemeClr val="lt1"/>
+          </a:fillRef>
+          <a:effectRef idx="0">
+            <a:schemeClr val="dk1"/>
+          </a:effectRef>
+          <a:fontRef idx="minor">
+            <a:schemeClr val="dk1"/>
+          </a:fontRef>
+        </p:style>
+        <p:txBody>
+          <a:bodyPr rtlCol="0" anchor="ctr"/>
+          <a:lstStyle/>
+          <a:p>
+            <a:pPr algn="ctr"/>
+            <a:r>
+              <a:rPr lang="en-US" altLang="zh-CN" sz="1600" b="1" dirty="0" smtClean="0"/>
+              <a:t>ALTO</a:t>
+            </a:r>
+            <a:r>
+              <a:rPr lang="zh-CN" altLang="en-US" sz="1600" b="1" dirty="0" smtClean="0"/>
+              <a:t> </a:t>
+            </a:r>
+            <a:r>
+              <a:rPr lang="en-US" altLang="zh-CN" sz="1600" b="1" dirty="0" smtClean="0"/>
+              <a:t>Controller</a:t>
+            </a:r>
+            <a:endParaRPr lang="en-GB" sz="1600" b="1" dirty="0"/>
+          </a:p>
+        </p:txBody>
+      </p:sp>
+      <p:sp>
+        <p:nvSpPr>
+          <p:cNvPr id="180" name="Rounded Rectangle 179"/>
+          <p:cNvSpPr/>
+          <p:nvPr/>
+        </p:nvSpPr>
+        <p:spPr>
+          <a:xfrm>
+            <a:off x="10038859" y="4849412"/>
+            <a:ext cx="1222970" cy="526553"/>
+          </a:xfrm>
+          <a:prstGeom prst="roundRect">
+            <a:avLst/>
+          </a:prstGeom>
+          <a:solidFill>
+            <a:schemeClr val="accent4">
+              <a:lumMod val="40000"/>
+              <a:lumOff val="60000"/>
+            </a:schemeClr>
+          </a:solidFill>
+          <a:effectLst>
+            <a:innerShdw blurRad="63500" dist="50800" dir="18900000">
+              <a:prstClr val="black">
+                <a:alpha val="50000"/>
+              </a:prstClr>
+            </a:innerShdw>
+          </a:effectLst>
+        </p:spPr>
+        <p:style>
+          <a:lnRef idx="2">
+            <a:schemeClr val="dk1"/>
+          </a:lnRef>
+          <a:fillRef idx="1">
+            <a:schemeClr val="lt1"/>
+          </a:fillRef>
+          <a:effectRef idx="0">
+            <a:schemeClr val="dk1"/>
+          </a:effectRef>
+          <a:fontRef idx="minor">
+            <a:schemeClr val="dk1"/>
+          </a:fontRef>
+        </p:style>
+        <p:txBody>
+          <a:bodyPr rtlCol="0" anchor="ctr"/>
+          <a:lstStyle/>
+          <a:p>
+            <a:pPr algn="ctr"/>
+            <a:r>
+              <a:rPr lang="en-US" altLang="zh-CN" sz="1600" b="1" dirty="0" smtClean="0"/>
+              <a:t>ALTO</a:t>
+            </a:r>
+            <a:r>
+              <a:rPr lang="zh-CN" altLang="en-US" sz="1600" b="1" dirty="0" smtClean="0"/>
+              <a:t> </a:t>
+            </a:r>
+            <a:r>
+              <a:rPr lang="en-US" altLang="zh-CN" sz="1600" b="1" dirty="0" smtClean="0"/>
+              <a:t>Controller</a:t>
+            </a:r>
+            <a:endParaRPr lang="en-GB" sz="1600" b="1" dirty="0"/>
+          </a:p>
+        </p:txBody>
+      </p:sp>
+      <p:sp>
+        <p:nvSpPr>
+          <p:cNvPr id="181" name="Content Placeholder 2"/>
+          <p:cNvSpPr>
+            <a:spLocks noGrp="1"/>
+          </p:cNvSpPr>
+          <p:nvPr>
+            <p:ph idx="1"/>
+          </p:nvPr>
+        </p:nvSpPr>
+        <p:spPr>
+          <a:xfrm>
+            <a:off x="292607" y="688911"/>
+            <a:ext cx="4505011" cy="5887965"/>
+          </a:xfrm>
+        </p:spPr>
+        <p:txBody>
+          <a:bodyPr>
+            <a:noAutofit/>
           </a:bodyPr>
           <a:lstStyle/>
           <a:p>
-            <a:r>
-              <a:rPr lang="en-GB" sz="4400" dirty="0" smtClean="0">
-                <a:latin typeface="+mj-lt"/>
-                <a:ea typeface="+mj-ea"/>
-                <a:cs typeface="+mj-cs"/>
-              </a:rPr>
-              <a:t>Components of </a:t>
-            </a:r>
-            <a:r>
-              <a:rPr lang="en-GB" sz="4400" dirty="0" err="1" smtClean="0">
-                <a:latin typeface="+mj-lt"/>
-                <a:ea typeface="+mj-ea"/>
-                <a:cs typeface="+mj-cs"/>
-              </a:rPr>
+            <a:pPr marL="342900" indent="-342900">
+              <a:lnSpc>
+                <a:spcPct val="70000"/>
+              </a:lnSpc>
+              <a:buFont typeface="+mj-lt"/>
+              <a:buAutoNum type="arabicParenR"/>
+            </a:pPr>
+            <a:r>
+              <a:rPr lang="en-US" altLang="zh-CN" sz="2000" dirty="0" smtClean="0"/>
+              <a:t>Users</a:t>
+            </a:r>
+            <a:r>
+              <a:rPr lang="zh-CN" altLang="en-US" sz="2000" dirty="0" smtClean="0"/>
+              <a:t> </a:t>
+            </a:r>
+            <a:r>
+              <a:rPr lang="en-US" altLang="zh-CN" sz="2000" dirty="0" smtClean="0"/>
+              <a:t>submit,</a:t>
+            </a:r>
+            <a:r>
+              <a:rPr lang="zh-CN" altLang="en-US" sz="2000" dirty="0" smtClean="0"/>
+              <a:t> </a:t>
+            </a:r>
+            <a:r>
+              <a:rPr lang="en-US" altLang="zh-CN" sz="2000" dirty="0" smtClean="0"/>
+              <a:t>track</a:t>
+            </a:r>
+            <a:r>
+              <a:rPr lang="zh-CN" altLang="en-US" sz="2000" dirty="0" smtClean="0"/>
+              <a:t> </a:t>
+            </a:r>
+            <a:r>
+              <a:rPr lang="en-US" altLang="zh-CN" sz="2000" dirty="0" smtClean="0"/>
+              <a:t>and</a:t>
+            </a:r>
+            <a:r>
+              <a:rPr lang="zh-CN" altLang="en-US" sz="2000" dirty="0" smtClean="0"/>
+              <a:t> </a:t>
+            </a:r>
+            <a:r>
+              <a:rPr lang="en-US" altLang="zh-CN" sz="2000" dirty="0" smtClean="0"/>
+              <a:t>manage</a:t>
+            </a:r>
+            <a:r>
+              <a:rPr lang="zh-CN" altLang="en-US" sz="2000" dirty="0" smtClean="0"/>
+              <a:t> </a:t>
+            </a:r>
+            <a:r>
+              <a:rPr lang="en-US" altLang="zh-CN" sz="2000" dirty="0" smtClean="0"/>
+              <a:t>dataset</a:t>
+            </a:r>
+            <a:r>
+              <a:rPr lang="zh-CN" altLang="en-US" sz="2000" dirty="0" smtClean="0"/>
+              <a:t> </a:t>
+            </a:r>
+            <a:r>
+              <a:rPr lang="en-US" altLang="zh-CN" sz="2000" dirty="0" smtClean="0"/>
+              <a:t>transfer</a:t>
+            </a:r>
+            <a:r>
+              <a:rPr lang="zh-CN" altLang="en-US" sz="2000" dirty="0" smtClean="0"/>
+              <a:t> </a:t>
+            </a:r>
+            <a:r>
+              <a:rPr lang="en-US" altLang="zh-CN" sz="2000" dirty="0" smtClean="0"/>
+              <a:t>requests</a:t>
+            </a:r>
+          </a:p>
+          <a:p>
+            <a:pPr marL="342900" indent="-342900">
+              <a:lnSpc>
+                <a:spcPct val="70000"/>
+              </a:lnSpc>
+              <a:buFont typeface="+mj-lt"/>
+              <a:buAutoNum type="arabicParenR"/>
+            </a:pPr>
+            <a:r>
+              <a:rPr lang="en-US" altLang="zh-CN" sz="2000" dirty="0" smtClean="0"/>
+              <a:t>Scheduler</a:t>
+            </a:r>
+            <a:r>
+              <a:rPr lang="zh-CN" altLang="en-US" sz="2000" dirty="0" smtClean="0"/>
+              <a:t> </a:t>
+            </a:r>
+            <a:r>
+              <a:rPr lang="en-US" altLang="zh-CN" sz="2000" dirty="0" smtClean="0"/>
+              <a:t>queries</a:t>
+            </a:r>
+            <a:r>
+              <a:rPr lang="zh-CN" altLang="en-US" sz="2000" dirty="0" smtClean="0"/>
+              <a:t> </a:t>
+            </a:r>
+            <a:r>
+              <a:rPr lang="en-US" altLang="zh-CN" sz="2000" dirty="0" smtClean="0"/>
+              <a:t>NEW</a:t>
+            </a:r>
+            <a:r>
+              <a:rPr lang="zh-CN" altLang="en-US" sz="2000" dirty="0" smtClean="0"/>
+              <a:t> </a:t>
+            </a:r>
+            <a:r>
+              <a:rPr lang="en-US" altLang="zh-CN" sz="2000" dirty="0" smtClean="0"/>
+              <a:t>requests</a:t>
+            </a:r>
+            <a:r>
+              <a:rPr lang="zh-CN" altLang="en-US" sz="2000" dirty="0" smtClean="0"/>
+              <a:t> </a:t>
+            </a:r>
+            <a:r>
+              <a:rPr lang="en-US" altLang="zh-CN" sz="2000" dirty="0" smtClean="0"/>
+              <a:t>via</a:t>
+            </a:r>
+            <a:r>
+              <a:rPr lang="zh-CN" altLang="en-US" sz="2000" dirty="0" smtClean="0"/>
+              <a:t> </a:t>
+            </a:r>
+            <a:r>
+              <a:rPr lang="en-US" altLang="zh-CN" sz="2000" dirty="0" err="1" smtClean="0"/>
               <a:t>ExaO</a:t>
             </a:r>
-            <a:endParaRPr lang="en-GB" sz="4400" dirty="0">
-              <a:latin typeface="+mj-lt"/>
-              <a:ea typeface="+mj-ea"/>
-              <a:cs typeface="+mj-cs"/>
-            </a:endParaRPr>
+            <a:r>
+              <a:rPr lang="zh-CN" altLang="en-US" sz="2000" dirty="0" smtClean="0"/>
+              <a:t> </a:t>
+            </a:r>
+            <a:r>
+              <a:rPr lang="en-US" altLang="zh-CN" sz="2000" dirty="0" smtClean="0"/>
+              <a:t>RESTful</a:t>
+            </a:r>
+            <a:r>
+              <a:rPr lang="zh-CN" altLang="en-US" sz="2000" dirty="0" smtClean="0"/>
+              <a:t> </a:t>
+            </a:r>
+            <a:r>
+              <a:rPr lang="en-US" altLang="zh-CN" sz="2000" dirty="0" smtClean="0"/>
+              <a:t>interface</a:t>
+            </a:r>
+          </a:p>
+          <a:p>
+            <a:pPr marL="342900" indent="-342900">
+              <a:lnSpc>
+                <a:spcPct val="70000"/>
+              </a:lnSpc>
+              <a:buFont typeface="+mj-lt"/>
+              <a:buAutoNum type="arabicParenR"/>
+            </a:pPr>
+            <a:r>
+              <a:rPr lang="en-US" altLang="zh-CN" sz="2000" dirty="0" smtClean="0"/>
+              <a:t>Scheduler</a:t>
+            </a:r>
+            <a:r>
+              <a:rPr lang="zh-CN" altLang="en-US" sz="2000" dirty="0" smtClean="0"/>
+              <a:t> </a:t>
+            </a:r>
+            <a:r>
+              <a:rPr lang="en-US" altLang="zh-CN" sz="2000" dirty="0" smtClean="0"/>
+              <a:t>queries</a:t>
+            </a:r>
+            <a:r>
+              <a:rPr lang="zh-CN" altLang="en-US" sz="2000" dirty="0" smtClean="0"/>
+              <a:t> </a:t>
+            </a:r>
+            <a:r>
+              <a:rPr lang="en-US" altLang="zh-CN" sz="2000" dirty="0" smtClean="0"/>
+              <a:t>ALTO</a:t>
+            </a:r>
+            <a:r>
+              <a:rPr lang="zh-CN" altLang="en-US" sz="2000" dirty="0" smtClean="0"/>
+              <a:t> </a:t>
+            </a:r>
+            <a:r>
+              <a:rPr lang="en-US" altLang="zh-CN" sz="2000" dirty="0" smtClean="0"/>
+              <a:t>controllers</a:t>
+            </a:r>
+            <a:r>
+              <a:rPr lang="zh-CN" altLang="en-US" sz="2000" dirty="0" smtClean="0"/>
+              <a:t> </a:t>
+            </a:r>
+            <a:r>
+              <a:rPr lang="en-US" altLang="zh-CN" sz="2000" dirty="0" smtClean="0"/>
+              <a:t>for</a:t>
+            </a:r>
+            <a:r>
+              <a:rPr lang="zh-CN" altLang="en-US" sz="2000" dirty="0" smtClean="0"/>
+              <a:t> </a:t>
+            </a:r>
+            <a:r>
+              <a:rPr lang="en-US" altLang="zh-CN" sz="2000" dirty="0" smtClean="0"/>
+              <a:t>routing</a:t>
+            </a:r>
+            <a:r>
+              <a:rPr lang="zh-CN" altLang="en-US" sz="2000" dirty="0" smtClean="0"/>
+              <a:t> </a:t>
+            </a:r>
+            <a:r>
+              <a:rPr lang="en-US" altLang="zh-CN" sz="2000" dirty="0" smtClean="0"/>
+              <a:t>state</a:t>
+            </a:r>
+          </a:p>
+          <a:p>
+            <a:pPr marL="342900" indent="-342900">
+              <a:lnSpc>
+                <a:spcPct val="70000"/>
+              </a:lnSpc>
+              <a:buFont typeface="+mj-lt"/>
+              <a:buAutoNum type="arabicParenR"/>
+            </a:pPr>
+            <a:r>
+              <a:rPr lang="en-US" altLang="zh-CN" sz="2000" dirty="0"/>
+              <a:t>ALTO</a:t>
+            </a:r>
+            <a:r>
+              <a:rPr lang="zh-CN" altLang="en-US" sz="2000" dirty="0"/>
+              <a:t> </a:t>
+            </a:r>
+            <a:r>
+              <a:rPr lang="en-US" altLang="zh-CN" sz="2000" dirty="0"/>
+              <a:t>controller</a:t>
+            </a:r>
+            <a:r>
+              <a:rPr lang="zh-CN" altLang="en-US" sz="2000" dirty="0"/>
+              <a:t> </a:t>
+            </a:r>
+            <a:r>
+              <a:rPr lang="en-US" altLang="zh-CN" sz="2000" dirty="0"/>
+              <a:t>collects</a:t>
+            </a:r>
+            <a:r>
+              <a:rPr lang="zh-CN" altLang="en-US" sz="2000" dirty="0"/>
+              <a:t> </a:t>
+            </a:r>
+            <a:r>
+              <a:rPr lang="en-US" altLang="zh-CN" sz="2000" dirty="0"/>
+              <a:t>complete</a:t>
+            </a:r>
+            <a:r>
+              <a:rPr lang="zh-CN" altLang="en-US" sz="2000" dirty="0"/>
+              <a:t> </a:t>
+            </a:r>
+            <a:r>
+              <a:rPr lang="en-US" altLang="zh-CN" sz="2000" dirty="0"/>
+              <a:t>network</a:t>
+            </a:r>
+            <a:r>
+              <a:rPr lang="zh-CN" altLang="en-US" sz="2000" dirty="0"/>
+              <a:t> </a:t>
+            </a:r>
+            <a:r>
+              <a:rPr lang="en-US" altLang="zh-CN" sz="2000" dirty="0"/>
+              <a:t>state</a:t>
+            </a:r>
+          </a:p>
+          <a:p>
+            <a:pPr marL="342900" indent="-342900">
+              <a:lnSpc>
+                <a:spcPct val="70000"/>
+              </a:lnSpc>
+              <a:buFont typeface="+mj-lt"/>
+              <a:buAutoNum type="arabicParenR"/>
+            </a:pPr>
+            <a:r>
+              <a:rPr lang="en-US" altLang="zh-CN" sz="2000" dirty="0" smtClean="0"/>
+              <a:t>ALTO</a:t>
+            </a:r>
+            <a:r>
+              <a:rPr lang="zh-CN" altLang="en-US" sz="2000" dirty="0" smtClean="0"/>
+              <a:t> </a:t>
+            </a:r>
+            <a:r>
+              <a:rPr lang="en-US" altLang="zh-CN" sz="2000" dirty="0" smtClean="0"/>
+              <a:t>controller</a:t>
+            </a:r>
+            <a:r>
+              <a:rPr lang="zh-CN" altLang="en-US" sz="2000" dirty="0" smtClean="0"/>
+              <a:t> </a:t>
+            </a:r>
+            <a:r>
+              <a:rPr lang="en-US" altLang="zh-CN" sz="2000" dirty="0" smtClean="0"/>
+              <a:t>computes</a:t>
+            </a:r>
+            <a:r>
+              <a:rPr lang="zh-CN" altLang="en-US" sz="2000" dirty="0" smtClean="0"/>
+              <a:t> </a:t>
+            </a:r>
+            <a:r>
+              <a:rPr lang="en-US" altLang="zh-CN" sz="2000" dirty="0" smtClean="0"/>
+              <a:t>on-demand,</a:t>
+            </a:r>
+            <a:r>
+              <a:rPr lang="zh-CN" altLang="en-US" sz="2000" dirty="0" smtClean="0"/>
+              <a:t> </a:t>
+            </a:r>
+            <a:r>
+              <a:rPr lang="en-US" altLang="zh-CN" sz="2000" dirty="0" smtClean="0"/>
+              <a:t>minimal,</a:t>
+            </a:r>
+            <a:r>
+              <a:rPr lang="zh-CN" altLang="en-US" sz="2000" dirty="0" smtClean="0"/>
+              <a:t> </a:t>
+            </a:r>
+            <a:r>
+              <a:rPr lang="en-US" altLang="zh-CN" sz="2000" dirty="0" smtClean="0"/>
+              <a:t>abstract</a:t>
+            </a:r>
+            <a:r>
+              <a:rPr lang="zh-CN" altLang="en-US" sz="2000" dirty="0" smtClean="0"/>
+              <a:t> </a:t>
+            </a:r>
+            <a:r>
+              <a:rPr lang="en-US" altLang="zh-CN" sz="2000" dirty="0" smtClean="0"/>
+              <a:t>routing</a:t>
+            </a:r>
+            <a:r>
+              <a:rPr lang="zh-CN" altLang="en-US" sz="2000" dirty="0" smtClean="0"/>
+              <a:t> </a:t>
+            </a:r>
+            <a:r>
+              <a:rPr lang="en-US" altLang="zh-CN" sz="2000" dirty="0" smtClean="0"/>
+              <a:t>state</a:t>
+            </a:r>
+            <a:r>
+              <a:rPr lang="zh-CN" altLang="en-US" sz="2000" dirty="0" smtClean="0"/>
+              <a:t> </a:t>
+            </a:r>
+            <a:r>
+              <a:rPr lang="en-US" altLang="zh-CN" sz="2000" dirty="0" smtClean="0"/>
+              <a:t>in</a:t>
+            </a:r>
+            <a:r>
+              <a:rPr lang="zh-CN" altLang="en-US" sz="2000" dirty="0" smtClean="0"/>
+              <a:t> </a:t>
+            </a:r>
+            <a:r>
+              <a:rPr lang="en-US" altLang="zh-CN" sz="2000" dirty="0" smtClean="0"/>
+              <a:t>response</a:t>
+            </a:r>
+            <a:r>
+              <a:rPr lang="zh-CN" altLang="en-US" sz="2000" dirty="0" smtClean="0"/>
+              <a:t> </a:t>
+            </a:r>
+            <a:r>
+              <a:rPr lang="en-US" altLang="zh-CN" sz="2000" dirty="0" smtClean="0"/>
+              <a:t>to</a:t>
+            </a:r>
+            <a:r>
+              <a:rPr lang="zh-CN" altLang="en-US" sz="2000" dirty="0" smtClean="0"/>
+              <a:t> </a:t>
+            </a:r>
+            <a:r>
+              <a:rPr lang="en-US" altLang="zh-CN" sz="2000" dirty="0" smtClean="0"/>
+              <a:t>query</a:t>
+            </a:r>
+          </a:p>
+          <a:p>
+            <a:pPr marL="342900" indent="-342900">
+              <a:lnSpc>
+                <a:spcPct val="70000"/>
+              </a:lnSpc>
+              <a:buFont typeface="+mj-lt"/>
+              <a:buAutoNum type="arabicParenR"/>
+            </a:pPr>
+            <a:r>
+              <a:rPr lang="en-US" altLang="zh-CN" sz="2000" dirty="0" smtClean="0"/>
+              <a:t>Scheduler</a:t>
+            </a:r>
+            <a:r>
+              <a:rPr lang="zh-CN" altLang="en-US" sz="2000" dirty="0" smtClean="0"/>
+              <a:t> </a:t>
+            </a:r>
+            <a:r>
+              <a:rPr lang="en-US" altLang="zh-CN" sz="2000" dirty="0" smtClean="0"/>
+              <a:t>makes</a:t>
+            </a:r>
+            <a:r>
+              <a:rPr lang="zh-CN" altLang="en-US" sz="2000" dirty="0" smtClean="0"/>
+              <a:t> </a:t>
+            </a:r>
+            <a:r>
+              <a:rPr lang="en-US" altLang="zh-CN" sz="2000" dirty="0" smtClean="0"/>
+              <a:t>centralized,</a:t>
+            </a:r>
+            <a:r>
+              <a:rPr lang="zh-CN" altLang="en-US" sz="2000" dirty="0" smtClean="0"/>
+              <a:t> </a:t>
+            </a:r>
+            <a:r>
+              <a:rPr lang="en-US" altLang="zh-CN" sz="2000" dirty="0" smtClean="0"/>
+              <a:t>dynamic,</a:t>
+            </a:r>
+            <a:r>
+              <a:rPr lang="zh-CN" altLang="en-US" sz="2000" dirty="0" smtClean="0"/>
+              <a:t> </a:t>
+            </a:r>
+            <a:r>
+              <a:rPr lang="en-US" altLang="zh-CN" sz="2000" dirty="0" smtClean="0"/>
+              <a:t>file-level</a:t>
+            </a:r>
+            <a:r>
+              <a:rPr lang="zh-CN" altLang="en-US" sz="2000" dirty="0" smtClean="0"/>
+              <a:t> </a:t>
+            </a:r>
+            <a:r>
+              <a:rPr lang="en-US" altLang="zh-CN" sz="2000" dirty="0" smtClean="0"/>
+              <a:t>scheduling</a:t>
+            </a:r>
+            <a:r>
+              <a:rPr lang="zh-CN" altLang="en-US" sz="2000" dirty="0" smtClean="0"/>
+              <a:t> </a:t>
+            </a:r>
+            <a:r>
+              <a:rPr lang="en-US" altLang="zh-CN" sz="2000" dirty="0" smtClean="0"/>
+              <a:t>and</a:t>
+            </a:r>
+            <a:r>
+              <a:rPr lang="zh-CN" altLang="en-US" sz="2000" dirty="0" smtClean="0"/>
+              <a:t> </a:t>
+            </a:r>
+            <a:r>
+              <a:rPr lang="en-US" altLang="zh-CN" sz="2000" dirty="0" smtClean="0"/>
+              <a:t>global</a:t>
+            </a:r>
+            <a:r>
+              <a:rPr lang="zh-CN" altLang="en-US" sz="2000" dirty="0" smtClean="0"/>
+              <a:t> </a:t>
+            </a:r>
+            <a:r>
+              <a:rPr lang="en-US" altLang="zh-CN" sz="2000" dirty="0" smtClean="0"/>
+              <a:t>network</a:t>
+            </a:r>
+            <a:r>
+              <a:rPr lang="zh-CN" altLang="en-US" sz="2000" dirty="0" smtClean="0"/>
+              <a:t> </a:t>
+            </a:r>
+            <a:r>
+              <a:rPr lang="en-US" altLang="zh-CN" sz="2000" dirty="0" smtClean="0"/>
+              <a:t>resource</a:t>
+            </a:r>
+            <a:r>
+              <a:rPr lang="zh-CN" altLang="en-US" sz="2000" dirty="0" smtClean="0"/>
+              <a:t> </a:t>
+            </a:r>
+            <a:r>
+              <a:rPr lang="en-US" altLang="zh-CN" sz="2000" dirty="0" smtClean="0"/>
+              <a:t>allocation</a:t>
+            </a:r>
+            <a:r>
+              <a:rPr lang="zh-CN" altLang="en-US" sz="2000" dirty="0" smtClean="0"/>
+              <a:t> </a:t>
+            </a:r>
+            <a:r>
+              <a:rPr lang="en-US" altLang="zh-CN" sz="2000" dirty="0" smtClean="0"/>
+              <a:t>decisions</a:t>
+            </a:r>
+            <a:endParaRPr lang="en-US" altLang="zh-CN" sz="2000" dirty="0"/>
+          </a:p>
+          <a:p>
+            <a:pPr marL="342900" indent="-342900">
+              <a:lnSpc>
+                <a:spcPct val="70000"/>
+              </a:lnSpc>
+              <a:buFont typeface="+mj-lt"/>
+              <a:buAutoNum type="arabicParenR"/>
+            </a:pPr>
+            <a:r>
+              <a:rPr lang="en-US" altLang="zh-CN" sz="2000" dirty="0" smtClean="0"/>
+              <a:t>Transfer</a:t>
+            </a:r>
+            <a:r>
+              <a:rPr lang="zh-CN" altLang="en-US" sz="2000" dirty="0" smtClean="0"/>
+              <a:t> </a:t>
+            </a:r>
+            <a:r>
+              <a:rPr lang="en-US" altLang="zh-CN" sz="2000" dirty="0" smtClean="0"/>
+              <a:t>Execution</a:t>
+            </a:r>
+            <a:r>
+              <a:rPr lang="zh-CN" altLang="en-US" sz="2000" dirty="0" smtClean="0"/>
+              <a:t> </a:t>
+            </a:r>
+            <a:r>
+              <a:rPr lang="en-US" altLang="zh-CN" sz="2000" dirty="0" smtClean="0"/>
+              <a:t>Nodes</a:t>
+            </a:r>
+            <a:r>
+              <a:rPr lang="zh-CN" altLang="en-US" sz="2000" dirty="0" smtClean="0"/>
+              <a:t> </a:t>
+            </a:r>
+            <a:r>
+              <a:rPr lang="en-US" altLang="zh-CN" sz="2000" dirty="0" smtClean="0"/>
+              <a:t>(TEN)</a:t>
+            </a:r>
+            <a:r>
+              <a:rPr lang="zh-CN" altLang="en-US" sz="2000" dirty="0" smtClean="0"/>
+              <a:t> </a:t>
+            </a:r>
+            <a:r>
+              <a:rPr lang="en-US" altLang="zh-CN" sz="2000" dirty="0" smtClean="0"/>
+              <a:t>query</a:t>
+            </a:r>
+            <a:r>
+              <a:rPr lang="zh-CN" altLang="en-US" sz="2000" dirty="0" smtClean="0"/>
+              <a:t> </a:t>
+            </a:r>
+            <a:r>
+              <a:rPr lang="en-US" altLang="zh-CN" sz="2000" dirty="0" smtClean="0"/>
+              <a:t>updated</a:t>
+            </a:r>
+            <a:r>
+              <a:rPr lang="zh-CN" altLang="en-US" sz="2000" dirty="0" smtClean="0"/>
+              <a:t> </a:t>
+            </a:r>
+            <a:r>
+              <a:rPr lang="en-US" altLang="zh-CN" sz="2000" dirty="0" smtClean="0"/>
+              <a:t>scheduling</a:t>
+            </a:r>
+            <a:r>
+              <a:rPr lang="zh-CN" altLang="en-US" sz="2000" dirty="0" smtClean="0"/>
+              <a:t> </a:t>
+            </a:r>
+            <a:r>
+              <a:rPr lang="en-US" altLang="zh-CN" sz="2000" dirty="0" smtClean="0"/>
+              <a:t>and</a:t>
+            </a:r>
+            <a:r>
+              <a:rPr lang="zh-CN" altLang="en-US" sz="2000" dirty="0" smtClean="0"/>
+              <a:t> </a:t>
+            </a:r>
+            <a:r>
+              <a:rPr lang="en-US" altLang="zh-CN" sz="2000" dirty="0" smtClean="0"/>
+              <a:t>allocation</a:t>
+            </a:r>
+            <a:r>
+              <a:rPr lang="zh-CN" altLang="en-US" sz="2000" dirty="0" smtClean="0"/>
+              <a:t> </a:t>
+            </a:r>
+            <a:r>
+              <a:rPr lang="en-US" altLang="zh-CN" sz="2000" dirty="0" smtClean="0"/>
+              <a:t>decisions</a:t>
+            </a:r>
+          </a:p>
+          <a:p>
+            <a:pPr marL="342900" indent="-342900">
+              <a:lnSpc>
+                <a:spcPct val="70000"/>
+              </a:lnSpc>
+              <a:buFont typeface="+mj-lt"/>
+              <a:buAutoNum type="arabicParenR"/>
+            </a:pPr>
+            <a:r>
+              <a:rPr lang="en-US" altLang="zh-CN" sz="2000" dirty="0" smtClean="0"/>
+              <a:t>TEN</a:t>
+            </a:r>
+            <a:r>
+              <a:rPr lang="zh-CN" altLang="en-US" sz="2000" dirty="0" smtClean="0"/>
+              <a:t> </a:t>
+            </a:r>
+            <a:r>
+              <a:rPr lang="en-US" altLang="zh-CN" sz="2000" dirty="0" smtClean="0"/>
+              <a:t>instruct</a:t>
+            </a:r>
+            <a:r>
+              <a:rPr lang="zh-CN" altLang="en-US" sz="2000" dirty="0" smtClean="0"/>
+              <a:t> </a:t>
+            </a:r>
+            <a:r>
+              <a:rPr lang="en-GB" sz="2000" dirty="0"/>
+              <a:t>efficient data transfer tools on end </a:t>
+            </a:r>
+            <a:r>
+              <a:rPr lang="en-GB" sz="2000" dirty="0" smtClean="0"/>
+              <a:t>hosts</a:t>
+            </a:r>
+            <a:r>
+              <a:rPr lang="zh-CN" altLang="en-US" sz="2000" dirty="0" smtClean="0"/>
+              <a:t> </a:t>
+            </a:r>
+            <a:r>
+              <a:rPr lang="en-US" altLang="zh-CN" sz="2000" dirty="0" smtClean="0"/>
+              <a:t>(e.g.,</a:t>
+            </a:r>
+            <a:r>
+              <a:rPr lang="zh-CN" altLang="en-US" sz="2000" dirty="0" smtClean="0"/>
+              <a:t> </a:t>
+            </a:r>
+            <a:r>
+              <a:rPr lang="en-US" altLang="zh-CN" sz="2000" dirty="0" smtClean="0"/>
+              <a:t>FDT)</a:t>
+            </a:r>
+            <a:r>
+              <a:rPr lang="zh-CN" altLang="en-US" sz="2000" dirty="0" smtClean="0"/>
+              <a:t> </a:t>
+            </a:r>
+            <a:r>
+              <a:rPr lang="en-US" altLang="zh-CN" sz="2000" dirty="0" smtClean="0"/>
+              <a:t>to</a:t>
+            </a:r>
+            <a:r>
+              <a:rPr lang="zh-CN" altLang="en-US" sz="2000" dirty="0" smtClean="0"/>
+              <a:t> </a:t>
+            </a:r>
+            <a:r>
+              <a:rPr lang="en-US" altLang="zh-CN" sz="2000" dirty="0" smtClean="0"/>
+              <a:t>enforce</a:t>
+            </a:r>
+            <a:r>
+              <a:rPr lang="zh-CN" altLang="en-US" sz="2000" dirty="0" smtClean="0"/>
+              <a:t> </a:t>
+            </a:r>
+            <a:r>
+              <a:rPr lang="en-US" altLang="zh-CN" sz="2000" dirty="0" smtClean="0"/>
+              <a:t>scheduling</a:t>
+            </a:r>
+            <a:r>
+              <a:rPr lang="zh-CN" altLang="en-US" sz="2000" dirty="0" smtClean="0"/>
+              <a:t> </a:t>
+            </a:r>
+            <a:r>
+              <a:rPr lang="en-US" altLang="zh-CN" sz="2000" dirty="0" smtClean="0"/>
+              <a:t>and</a:t>
+            </a:r>
+            <a:r>
+              <a:rPr lang="zh-CN" altLang="en-US" sz="2000" dirty="0" smtClean="0"/>
+              <a:t> </a:t>
+            </a:r>
+            <a:r>
+              <a:rPr lang="en-US" altLang="zh-CN" sz="2000" dirty="0" smtClean="0"/>
+              <a:t>allocation</a:t>
+            </a:r>
+            <a:r>
+              <a:rPr lang="zh-CN" altLang="en-US" sz="2000" dirty="0" smtClean="0"/>
+              <a:t> </a:t>
+            </a:r>
+            <a:r>
+              <a:rPr lang="en-US" altLang="zh-CN" sz="2000" dirty="0" smtClean="0"/>
+              <a:t>decisions</a:t>
+            </a:r>
+          </a:p>
+          <a:p>
+            <a:pPr marL="342900" indent="-342900">
+              <a:lnSpc>
+                <a:spcPct val="70000"/>
+              </a:lnSpc>
+              <a:buFont typeface="+mj-lt"/>
+              <a:buAutoNum type="arabicParenR"/>
+            </a:pPr>
+            <a:r>
+              <a:rPr lang="en-US" altLang="zh-CN" sz="2000" dirty="0" err="1" smtClean="0"/>
+              <a:t>MonALISA</a:t>
+            </a:r>
+            <a:r>
+              <a:rPr lang="zh-CN" altLang="en-US" sz="2000" dirty="0" smtClean="0"/>
+              <a:t> </a:t>
+            </a:r>
+            <a:r>
+              <a:rPr lang="en-US" altLang="zh-CN" sz="2000" dirty="0" smtClean="0"/>
+              <a:t>sensors</a:t>
+            </a:r>
+            <a:r>
+              <a:rPr lang="zh-CN" altLang="en-US" sz="2000" dirty="0" smtClean="0"/>
+              <a:t>  </a:t>
+            </a:r>
+            <a:r>
+              <a:rPr lang="en-US" altLang="zh-CN" sz="2000" dirty="0" smtClean="0"/>
+              <a:t>monitor</a:t>
+            </a:r>
+            <a:r>
+              <a:rPr lang="zh-CN" altLang="en-US" sz="2000" dirty="0" smtClean="0"/>
+              <a:t> </a:t>
+            </a:r>
+            <a:r>
+              <a:rPr lang="en-US" altLang="zh-CN" sz="2000" dirty="0" smtClean="0"/>
+              <a:t>data</a:t>
+            </a:r>
+            <a:r>
+              <a:rPr lang="zh-CN" altLang="en-US" sz="2000" dirty="0" smtClean="0"/>
+              <a:t> </a:t>
+            </a:r>
+            <a:r>
+              <a:rPr lang="en-US" altLang="zh-CN" sz="2000" dirty="0" smtClean="0"/>
+              <a:t>transfer</a:t>
+            </a:r>
+            <a:r>
+              <a:rPr lang="zh-CN" altLang="en-US" sz="2000" dirty="0" smtClean="0"/>
+              <a:t> </a:t>
+            </a:r>
+            <a:r>
+              <a:rPr lang="en-US" altLang="zh-CN" sz="2000" dirty="0" smtClean="0"/>
+              <a:t>status</a:t>
+            </a:r>
+            <a:r>
+              <a:rPr lang="zh-CN" altLang="en-US" sz="2000" dirty="0" smtClean="0"/>
+              <a:t> </a:t>
+            </a:r>
+            <a:r>
+              <a:rPr lang="en-US" altLang="zh-CN" sz="2000" dirty="0" smtClean="0"/>
+              <a:t>and</a:t>
+            </a:r>
+            <a:r>
+              <a:rPr lang="zh-CN" altLang="en-US" sz="2000" dirty="0" smtClean="0"/>
+              <a:t> </a:t>
+            </a:r>
+            <a:r>
+              <a:rPr lang="en-US" altLang="zh-CN" sz="2000" dirty="0" smtClean="0"/>
+              <a:t>send</a:t>
+            </a:r>
+            <a:r>
+              <a:rPr lang="zh-CN" altLang="en-US" sz="2000" dirty="0" smtClean="0"/>
+              <a:t> </a:t>
+            </a:r>
+            <a:r>
+              <a:rPr lang="en-US" altLang="zh-CN" sz="2000" dirty="0" smtClean="0"/>
+              <a:t>update</a:t>
+            </a:r>
+            <a:r>
+              <a:rPr lang="zh-CN" altLang="en-US" sz="2000" dirty="0" smtClean="0"/>
+              <a:t> </a:t>
+            </a:r>
+            <a:r>
+              <a:rPr lang="en-US" altLang="zh-CN" sz="2000" dirty="0" smtClean="0"/>
+              <a:t>back</a:t>
+            </a:r>
           </a:p>
         </p:txBody>
       </p:sp>
     </p:spTree>
     <p:extLst>
       <p:ext uri="{BB962C8B-B14F-4D97-AF65-F5344CB8AC3E}">
-        <p14:creationId xmlns:p14="http://schemas.microsoft.com/office/powerpoint/2010/main" val="934554512"/>
+        <p14:creationId xmlns:p14="http://schemas.microsoft.com/office/powerpoint/2010/main" val="873956687"/>
       </p:ext>
     </p:extLst>
   </p:cSld>

</xml_diff>